<commit_message>
Update LMS Slide Introduce
</commit_message>
<xml_diff>
--- a/LMS_Silde_Introduce.pptx
+++ b/LMS_Silde_Introduce.pptx
@@ -6,8 +6,11 @@
   </p:sldMasterIdLst>
   <p:sldIdLst>
     <p:sldId id="256" r:id="rId2"/>
-    <p:sldId id="257" r:id="rId3"/>
-    <p:sldId id="258" r:id="rId4"/>
+    <p:sldId id="261" r:id="rId3"/>
+    <p:sldId id="257" r:id="rId4"/>
+    <p:sldId id="259" r:id="rId5"/>
+    <p:sldId id="260" r:id="rId6"/>
+    <p:sldId id="258" r:id="rId7"/>
   </p:sldIdLst>
   <p:sldSz cx="12192000" cy="6858000"/>
   <p:notesSz cx="6858000" cy="9144000"/>
@@ -106,6 +109,11 @@
       </a:defRPr>
     </a:lvl9pPr>
   </p:defaultTextStyle>
+  <p:extLst>
+    <p:ext uri="{EFAFB233-063F-42B5-8137-9DF3F51BA10A}">
+      <p15:sldGuideLst xmlns:p15="http://schemas.microsoft.com/office/powerpoint/2012/main"/>
+    </p:ext>
+  </p:extLst>
 </p:presentation>
 </file>
 
@@ -256,7 +264,7 @@
           <a:p>
             <a:fld id="{332EA610-D66C-46FE-8C50-B422D8481B3A}" type="datetimeFigureOut">
               <a:rPr lang="en-US" smtClean="0"/>
-              <a:t>8/11/2018</a:t>
+              <a:t>8/14/2018</a:t>
             </a:fld>
             <a:endParaRPr lang="en-US"/>
           </a:p>
@@ -454,7 +462,7 @@
           <a:p>
             <a:fld id="{332EA610-D66C-46FE-8C50-B422D8481B3A}" type="datetimeFigureOut">
               <a:rPr lang="en-US" smtClean="0"/>
-              <a:t>8/11/2018</a:t>
+              <a:t>8/14/2018</a:t>
             </a:fld>
             <a:endParaRPr lang="en-US"/>
           </a:p>
@@ -662,7 +670,7 @@
           <a:p>
             <a:fld id="{332EA610-D66C-46FE-8C50-B422D8481B3A}" type="datetimeFigureOut">
               <a:rPr lang="en-US" smtClean="0"/>
-              <a:t>8/11/2018</a:t>
+              <a:t>8/14/2018</a:t>
             </a:fld>
             <a:endParaRPr lang="en-US"/>
           </a:p>
@@ -860,7 +868,7 @@
           <a:p>
             <a:fld id="{332EA610-D66C-46FE-8C50-B422D8481B3A}" type="datetimeFigureOut">
               <a:rPr lang="en-US" smtClean="0"/>
-              <a:t>8/11/2018</a:t>
+              <a:t>8/14/2018</a:t>
             </a:fld>
             <a:endParaRPr lang="en-US"/>
           </a:p>
@@ -1135,7 +1143,7 @@
           <a:p>
             <a:fld id="{332EA610-D66C-46FE-8C50-B422D8481B3A}" type="datetimeFigureOut">
               <a:rPr lang="en-US" smtClean="0"/>
-              <a:t>8/11/2018</a:t>
+              <a:t>8/14/2018</a:t>
             </a:fld>
             <a:endParaRPr lang="en-US"/>
           </a:p>
@@ -1400,7 +1408,7 @@
           <a:p>
             <a:fld id="{332EA610-D66C-46FE-8C50-B422D8481B3A}" type="datetimeFigureOut">
               <a:rPr lang="en-US" smtClean="0"/>
-              <a:t>8/11/2018</a:t>
+              <a:t>8/14/2018</a:t>
             </a:fld>
             <a:endParaRPr lang="en-US"/>
           </a:p>
@@ -1812,7 +1820,7 @@
           <a:p>
             <a:fld id="{332EA610-D66C-46FE-8C50-B422D8481B3A}" type="datetimeFigureOut">
               <a:rPr lang="en-US" smtClean="0"/>
-              <a:t>8/11/2018</a:t>
+              <a:t>8/14/2018</a:t>
             </a:fld>
             <a:endParaRPr lang="en-US"/>
           </a:p>
@@ -1953,7 +1961,7 @@
           <a:p>
             <a:fld id="{332EA610-D66C-46FE-8C50-B422D8481B3A}" type="datetimeFigureOut">
               <a:rPr lang="en-US" smtClean="0"/>
-              <a:t>8/11/2018</a:t>
+              <a:t>8/14/2018</a:t>
             </a:fld>
             <a:endParaRPr lang="en-US"/>
           </a:p>
@@ -2066,7 +2074,7 @@
           <a:p>
             <a:fld id="{332EA610-D66C-46FE-8C50-B422D8481B3A}" type="datetimeFigureOut">
               <a:rPr lang="en-US" smtClean="0"/>
-              <a:t>8/11/2018</a:t>
+              <a:t>8/14/2018</a:t>
             </a:fld>
             <a:endParaRPr lang="en-US"/>
           </a:p>
@@ -2377,7 +2385,7 @@
           <a:p>
             <a:fld id="{332EA610-D66C-46FE-8C50-B422D8481B3A}" type="datetimeFigureOut">
               <a:rPr lang="en-US" smtClean="0"/>
-              <a:t>8/11/2018</a:t>
+              <a:t>8/14/2018</a:t>
             </a:fld>
             <a:endParaRPr lang="en-US"/>
           </a:p>
@@ -2665,7 +2673,7 @@
           <a:p>
             <a:fld id="{332EA610-D66C-46FE-8C50-B422D8481B3A}" type="datetimeFigureOut">
               <a:rPr lang="en-US" smtClean="0"/>
-              <a:t>8/11/2018</a:t>
+              <a:t>8/14/2018</a:t>
             </a:fld>
             <a:endParaRPr lang="en-US"/>
           </a:p>
@@ -2906,7 +2914,7 @@
           <a:p>
             <a:fld id="{332EA610-D66C-46FE-8C50-B422D8481B3A}" type="datetimeFigureOut">
               <a:rPr lang="en-US" smtClean="0"/>
-              <a:t>8/11/2018</a:t>
+              <a:t>8/14/2018</a:t>
             </a:fld>
             <a:endParaRPr lang="en-US"/>
           </a:p>
@@ -4188,6 +4196,1009 @@
       </p:grpSpPr>
       <p:sp>
         <p:nvSpPr>
+          <p:cNvPr id="9" name="Rectangle: Rounded Corners 8">
+            <a:extLst>
+              <a:ext uri="{FF2B5EF4-FFF2-40B4-BE49-F238E27FC236}">
+                <a16:creationId xmlns:a16="http://schemas.microsoft.com/office/drawing/2014/main" id="{A45C368E-4F42-46C0-8A1A-810610147305}"/>
+              </a:ext>
+            </a:extLst>
+          </p:cNvPr>
+          <p:cNvSpPr/>
+          <p:nvPr/>
+        </p:nvSpPr>
+        <p:spPr>
+          <a:xfrm>
+            <a:off x="736979" y="1474589"/>
+            <a:ext cx="3725839" cy="1214651"/>
+          </a:xfrm>
+          <a:prstGeom prst="roundRect">
+            <a:avLst/>
+          </a:prstGeom>
+        </p:spPr>
+        <p:style>
+          <a:lnRef idx="2">
+            <a:schemeClr val="accent6"/>
+          </a:lnRef>
+          <a:fillRef idx="1">
+            <a:schemeClr val="lt1"/>
+          </a:fillRef>
+          <a:effectRef idx="0">
+            <a:schemeClr val="accent6"/>
+          </a:effectRef>
+          <a:fontRef idx="minor">
+            <a:schemeClr val="dk1"/>
+          </a:fontRef>
+        </p:style>
+        <p:txBody>
+          <a:bodyPr rtlCol="0" anchor="ctr"/>
+          <a:lstStyle/>
+          <a:p>
+            <a:pPr algn="just"/>
+            <a:r>
+              <a:rPr lang="en-US" dirty="0" err="1"/>
+              <a:t>Bạn</a:t>
+            </a:r>
+            <a:r>
+              <a:rPr lang="en-US" dirty="0"/>
+              <a:t> </a:t>
+            </a:r>
+            <a:r>
+              <a:rPr lang="en-US" dirty="0" err="1"/>
+              <a:t>muốn</a:t>
+            </a:r>
+            <a:r>
+              <a:rPr lang="en-US" dirty="0"/>
+              <a:t> </a:t>
+            </a:r>
+            <a:r>
+              <a:rPr lang="en-US" dirty="0" err="1"/>
+              <a:t>học</a:t>
+            </a:r>
+            <a:r>
+              <a:rPr lang="en-US" dirty="0"/>
+              <a:t> </a:t>
+            </a:r>
+            <a:r>
+              <a:rPr lang="en-US" dirty="0" err="1"/>
+              <a:t>nh</a:t>
+            </a:r>
+            <a:r>
+              <a:rPr lang="vi-VN" dirty="0"/>
+              <a:t>ư</a:t>
+            </a:r>
+            <a:r>
+              <a:rPr lang="en-US" dirty="0"/>
+              <a:t>ng </a:t>
+            </a:r>
+            <a:r>
+              <a:rPr lang="en-US" dirty="0" err="1"/>
+              <a:t>không</a:t>
+            </a:r>
+            <a:r>
+              <a:rPr lang="en-US" dirty="0"/>
+              <a:t> </a:t>
+            </a:r>
+            <a:r>
+              <a:rPr lang="en-US" dirty="0" err="1"/>
+              <a:t>có</a:t>
+            </a:r>
+            <a:r>
+              <a:rPr lang="en-US" dirty="0"/>
+              <a:t> </a:t>
+            </a:r>
+            <a:r>
+              <a:rPr lang="en-US" dirty="0" err="1"/>
+              <a:t>thời</a:t>
+            </a:r>
+            <a:r>
+              <a:rPr lang="en-US" dirty="0"/>
+              <a:t> </a:t>
+            </a:r>
+            <a:r>
+              <a:rPr lang="en-US" dirty="0" err="1"/>
+              <a:t>gian</a:t>
+            </a:r>
+            <a:r>
+              <a:rPr lang="en-US" dirty="0"/>
+              <a:t> </a:t>
+            </a:r>
+            <a:r>
+              <a:rPr lang="en-US" dirty="0" err="1"/>
+              <a:t>đến</a:t>
+            </a:r>
+            <a:r>
+              <a:rPr lang="en-US" dirty="0"/>
+              <a:t> </a:t>
+            </a:r>
+            <a:r>
+              <a:rPr lang="en-US" dirty="0" err="1"/>
+              <a:t>các</a:t>
+            </a:r>
+            <a:r>
+              <a:rPr lang="en-US" dirty="0"/>
+              <a:t> </a:t>
+            </a:r>
+            <a:r>
+              <a:rPr lang="en-US" dirty="0" err="1"/>
+              <a:t>trung</a:t>
+            </a:r>
+            <a:r>
+              <a:rPr lang="en-US" dirty="0"/>
+              <a:t> </a:t>
+            </a:r>
+            <a:r>
+              <a:rPr lang="en-US" dirty="0" err="1"/>
+              <a:t>tâm</a:t>
+            </a:r>
+            <a:endParaRPr lang="en-US" dirty="0"/>
+          </a:p>
+        </p:txBody>
+      </p:sp>
+      <p:sp>
+        <p:nvSpPr>
+          <p:cNvPr id="13" name="Rectangle: Rounded Corners 12">
+            <a:extLst>
+              <a:ext uri="{FF2B5EF4-FFF2-40B4-BE49-F238E27FC236}">
+                <a16:creationId xmlns:a16="http://schemas.microsoft.com/office/drawing/2014/main" id="{BB8201C2-5B27-42FC-8164-3B40BBB90B5F}"/>
+              </a:ext>
+            </a:extLst>
+          </p:cNvPr>
+          <p:cNvSpPr/>
+          <p:nvPr/>
+        </p:nvSpPr>
+        <p:spPr>
+          <a:xfrm>
+            <a:off x="736978" y="2906551"/>
+            <a:ext cx="3725839" cy="1214651"/>
+          </a:xfrm>
+          <a:prstGeom prst="roundRect">
+            <a:avLst/>
+          </a:prstGeom>
+        </p:spPr>
+        <p:style>
+          <a:lnRef idx="2">
+            <a:schemeClr val="accent6"/>
+          </a:lnRef>
+          <a:fillRef idx="1">
+            <a:schemeClr val="lt1"/>
+          </a:fillRef>
+          <a:effectRef idx="0">
+            <a:schemeClr val="accent6"/>
+          </a:effectRef>
+          <a:fontRef idx="minor">
+            <a:schemeClr val="dk1"/>
+          </a:fontRef>
+        </p:style>
+        <p:txBody>
+          <a:bodyPr rtlCol="0" anchor="ctr"/>
+          <a:lstStyle/>
+          <a:p>
+            <a:r>
+              <a:rPr lang="en-US" dirty="0" err="1"/>
+              <a:t>Bạn</a:t>
+            </a:r>
+            <a:r>
+              <a:rPr lang="en-US" dirty="0"/>
+              <a:t> </a:t>
+            </a:r>
+            <a:r>
+              <a:rPr lang="en-US" dirty="0" err="1"/>
+              <a:t>muốn</a:t>
+            </a:r>
+            <a:r>
+              <a:rPr lang="en-US" dirty="0"/>
+              <a:t> </a:t>
+            </a:r>
+            <a:r>
+              <a:rPr lang="en-US" dirty="0" err="1"/>
+              <a:t>bổ</a:t>
+            </a:r>
+            <a:r>
+              <a:rPr lang="en-US" dirty="0"/>
+              <a:t> sung </a:t>
+            </a:r>
+            <a:r>
+              <a:rPr lang="en-US" dirty="0" err="1"/>
+              <a:t>thêm</a:t>
+            </a:r>
+            <a:r>
+              <a:rPr lang="en-US" dirty="0"/>
+              <a:t> </a:t>
+            </a:r>
+            <a:r>
+              <a:rPr lang="en-US" dirty="0" err="1"/>
+              <a:t>những</a:t>
+            </a:r>
+            <a:r>
+              <a:rPr lang="en-US" dirty="0"/>
+              <a:t> </a:t>
+            </a:r>
+            <a:r>
+              <a:rPr lang="en-US" dirty="0" err="1"/>
+              <a:t>kiến</a:t>
+            </a:r>
+            <a:r>
+              <a:rPr lang="en-US" dirty="0"/>
+              <a:t> </a:t>
+            </a:r>
+            <a:r>
+              <a:rPr lang="en-US" dirty="0" err="1"/>
+              <a:t>thức</a:t>
+            </a:r>
+            <a:r>
+              <a:rPr lang="en-US" dirty="0"/>
+              <a:t> </a:t>
+            </a:r>
+            <a:r>
+              <a:rPr lang="en-US" dirty="0" err="1"/>
+              <a:t>mà</a:t>
+            </a:r>
+            <a:r>
+              <a:rPr lang="en-US" dirty="0"/>
+              <a:t> tr</a:t>
+            </a:r>
+            <a:r>
+              <a:rPr lang="vi-VN" dirty="0"/>
+              <a:t>ư</a:t>
+            </a:r>
+            <a:r>
+              <a:rPr lang="en-US" dirty="0" err="1"/>
+              <a:t>ờng</a:t>
+            </a:r>
+            <a:r>
+              <a:rPr lang="en-US" dirty="0"/>
+              <a:t> </a:t>
+            </a:r>
+            <a:r>
+              <a:rPr lang="en-US" dirty="0" err="1"/>
+              <a:t>ch</a:t>
+            </a:r>
+            <a:r>
+              <a:rPr lang="vi-VN" dirty="0"/>
+              <a:t>ư</a:t>
+            </a:r>
+            <a:r>
+              <a:rPr lang="en-US" dirty="0"/>
+              <a:t>a </a:t>
+            </a:r>
+            <a:r>
+              <a:rPr lang="en-US" dirty="0" err="1"/>
+              <a:t>cung</a:t>
+            </a:r>
+            <a:r>
+              <a:rPr lang="en-US" dirty="0"/>
+              <a:t> </a:t>
+            </a:r>
+            <a:r>
+              <a:rPr lang="en-US" dirty="0" err="1"/>
+              <a:t>cấp</a:t>
+            </a:r>
+            <a:endParaRPr lang="en-US" dirty="0"/>
+          </a:p>
+        </p:txBody>
+      </p:sp>
+      <p:sp>
+        <p:nvSpPr>
+          <p:cNvPr id="14" name="Rectangle: Rounded Corners 13">
+            <a:extLst>
+              <a:ext uri="{FF2B5EF4-FFF2-40B4-BE49-F238E27FC236}">
+                <a16:creationId xmlns:a16="http://schemas.microsoft.com/office/drawing/2014/main" id="{A65FA341-9FB0-4D7E-B267-663F2331B4FF}"/>
+              </a:ext>
+            </a:extLst>
+          </p:cNvPr>
+          <p:cNvSpPr/>
+          <p:nvPr/>
+        </p:nvSpPr>
+        <p:spPr>
+          <a:xfrm>
+            <a:off x="736978" y="4338514"/>
+            <a:ext cx="3725839" cy="1214651"/>
+          </a:xfrm>
+          <a:prstGeom prst="roundRect">
+            <a:avLst/>
+          </a:prstGeom>
+        </p:spPr>
+        <p:style>
+          <a:lnRef idx="2">
+            <a:schemeClr val="accent6"/>
+          </a:lnRef>
+          <a:fillRef idx="1">
+            <a:schemeClr val="lt1"/>
+          </a:fillRef>
+          <a:effectRef idx="0">
+            <a:schemeClr val="accent6"/>
+          </a:effectRef>
+          <a:fontRef idx="minor">
+            <a:schemeClr val="dk1"/>
+          </a:fontRef>
+        </p:style>
+        <p:txBody>
+          <a:bodyPr rtlCol="0" anchor="ctr"/>
+          <a:lstStyle/>
+          <a:p>
+            <a:pPr algn="just"/>
+            <a:r>
+              <a:rPr lang="en-US" dirty="0" err="1"/>
+              <a:t>Bạn</a:t>
+            </a:r>
+            <a:r>
+              <a:rPr lang="en-US" dirty="0"/>
+              <a:t> </a:t>
+            </a:r>
+            <a:r>
+              <a:rPr lang="en-US" dirty="0" err="1"/>
+              <a:t>muốn</a:t>
+            </a:r>
+            <a:r>
+              <a:rPr lang="en-US" dirty="0"/>
+              <a:t> </a:t>
+            </a:r>
+            <a:r>
+              <a:rPr lang="en-US" dirty="0" err="1"/>
+              <a:t>tiếp</a:t>
+            </a:r>
+            <a:r>
+              <a:rPr lang="en-US" dirty="0"/>
+              <a:t> </a:t>
+            </a:r>
+            <a:r>
+              <a:rPr lang="en-US" dirty="0" err="1"/>
+              <a:t>cận</a:t>
+            </a:r>
+            <a:r>
+              <a:rPr lang="en-US" dirty="0"/>
+              <a:t> </a:t>
+            </a:r>
+            <a:r>
+              <a:rPr lang="en-US" dirty="0" err="1"/>
+              <a:t>những</a:t>
+            </a:r>
+            <a:r>
+              <a:rPr lang="en-US" dirty="0"/>
+              <a:t> </a:t>
+            </a:r>
+            <a:r>
+              <a:rPr lang="en-US" dirty="0" err="1"/>
+              <a:t>lĩnh</a:t>
+            </a:r>
+            <a:r>
+              <a:rPr lang="en-US" dirty="0"/>
+              <a:t> </a:t>
+            </a:r>
+            <a:r>
+              <a:rPr lang="en-US" dirty="0" err="1"/>
+              <a:t>vực</a:t>
+            </a:r>
+            <a:r>
+              <a:rPr lang="en-US" dirty="0"/>
+              <a:t> </a:t>
+            </a:r>
+            <a:r>
+              <a:rPr lang="en-US" dirty="0" err="1"/>
+              <a:t>mới</a:t>
+            </a:r>
+            <a:r>
+              <a:rPr lang="en-US" dirty="0"/>
+              <a:t> </a:t>
+            </a:r>
+            <a:r>
+              <a:rPr lang="en-US" dirty="0" err="1"/>
+              <a:t>mà</a:t>
+            </a:r>
+            <a:r>
+              <a:rPr lang="en-US" dirty="0"/>
+              <a:t> </a:t>
+            </a:r>
+            <a:r>
+              <a:rPr lang="en-US" dirty="0" err="1"/>
+              <a:t>quốc</a:t>
+            </a:r>
+            <a:r>
+              <a:rPr lang="en-US" dirty="0"/>
+              <a:t> </a:t>
+            </a:r>
+            <a:r>
+              <a:rPr lang="en-US" dirty="0" err="1"/>
+              <a:t>gia</a:t>
+            </a:r>
+            <a:r>
+              <a:rPr lang="en-US" dirty="0"/>
+              <a:t> </a:t>
+            </a:r>
+            <a:r>
+              <a:rPr lang="en-US" dirty="0" err="1"/>
+              <a:t>bạn</a:t>
+            </a:r>
+            <a:r>
+              <a:rPr lang="en-US" dirty="0"/>
+              <a:t> </a:t>
+            </a:r>
+            <a:r>
+              <a:rPr lang="en-US" dirty="0" err="1"/>
+              <a:t>ch</a:t>
+            </a:r>
+            <a:r>
+              <a:rPr lang="vi-VN" dirty="0"/>
+              <a:t>ư</a:t>
+            </a:r>
+            <a:r>
+              <a:rPr lang="en-US" dirty="0"/>
+              <a:t>a </a:t>
+            </a:r>
+            <a:r>
+              <a:rPr lang="en-US" dirty="0" err="1"/>
+              <a:t>phổ</a:t>
+            </a:r>
+            <a:r>
+              <a:rPr lang="en-US" dirty="0"/>
+              <a:t> </a:t>
+            </a:r>
+            <a:r>
+              <a:rPr lang="en-US" dirty="0" err="1"/>
+              <a:t>biến</a:t>
+            </a:r>
+            <a:endParaRPr lang="en-US" dirty="0"/>
+          </a:p>
+        </p:txBody>
+      </p:sp>
+      <p:sp>
+        <p:nvSpPr>
+          <p:cNvPr id="15" name="Arrow: Right 14">
+            <a:extLst>
+              <a:ext uri="{FF2B5EF4-FFF2-40B4-BE49-F238E27FC236}">
+                <a16:creationId xmlns:a16="http://schemas.microsoft.com/office/drawing/2014/main" id="{4C4688FF-72F3-4AED-9691-FFDB36012330}"/>
+              </a:ext>
+            </a:extLst>
+          </p:cNvPr>
+          <p:cNvSpPr/>
+          <p:nvPr/>
+        </p:nvSpPr>
+        <p:spPr>
+          <a:xfrm>
+            <a:off x="5049672" y="2821674"/>
+            <a:ext cx="1501253" cy="1214651"/>
+          </a:xfrm>
+          <a:prstGeom prst="rightArrow">
+            <a:avLst/>
+          </a:prstGeom>
+        </p:spPr>
+        <p:style>
+          <a:lnRef idx="2">
+            <a:schemeClr val="accent6"/>
+          </a:lnRef>
+          <a:fillRef idx="1">
+            <a:schemeClr val="lt1"/>
+          </a:fillRef>
+          <a:effectRef idx="0">
+            <a:schemeClr val="accent6"/>
+          </a:effectRef>
+          <a:fontRef idx="minor">
+            <a:schemeClr val="dk1"/>
+          </a:fontRef>
+        </p:style>
+        <p:txBody>
+          <a:bodyPr rtlCol="0" anchor="ctr"/>
+          <a:lstStyle/>
+          <a:p>
+            <a:pPr algn="ctr"/>
+            <a:endParaRPr lang="en-US"/>
+          </a:p>
+        </p:txBody>
+      </p:sp>
+      <p:sp>
+        <p:nvSpPr>
+          <p:cNvPr id="16" name="Rectangle: Rounded Corners 15">
+            <a:extLst>
+              <a:ext uri="{FF2B5EF4-FFF2-40B4-BE49-F238E27FC236}">
+                <a16:creationId xmlns:a16="http://schemas.microsoft.com/office/drawing/2014/main" id="{F176AB7D-6562-490C-95DD-72E4246688B2}"/>
+              </a:ext>
+            </a:extLst>
+          </p:cNvPr>
+          <p:cNvSpPr/>
+          <p:nvPr/>
+        </p:nvSpPr>
+        <p:spPr>
+          <a:xfrm>
+            <a:off x="7033142" y="1474589"/>
+            <a:ext cx="4203511" cy="4078576"/>
+          </a:xfrm>
+          <a:prstGeom prst="roundRect">
+            <a:avLst/>
+          </a:prstGeom>
+        </p:spPr>
+        <p:style>
+          <a:lnRef idx="2">
+            <a:schemeClr val="accent6"/>
+          </a:lnRef>
+          <a:fillRef idx="1">
+            <a:schemeClr val="lt1"/>
+          </a:fillRef>
+          <a:effectRef idx="0">
+            <a:schemeClr val="accent6"/>
+          </a:effectRef>
+          <a:fontRef idx="minor">
+            <a:schemeClr val="dk1"/>
+          </a:fontRef>
+        </p:style>
+        <p:txBody>
+          <a:bodyPr rtlCol="0" anchor="ctr"/>
+          <a:lstStyle/>
+          <a:p>
+            <a:r>
+              <a:rPr lang="en-US" dirty="0" err="1"/>
+              <a:t>Đến</a:t>
+            </a:r>
+            <a:r>
+              <a:rPr lang="en-US" dirty="0"/>
+              <a:t> </a:t>
+            </a:r>
+            <a:r>
+              <a:rPr lang="en-US" dirty="0" err="1"/>
+              <a:t>với</a:t>
+            </a:r>
+            <a:r>
+              <a:rPr lang="en-US" dirty="0"/>
+              <a:t> HONEYLARN</a:t>
+            </a:r>
+            <a:br>
+              <a:rPr lang="en-US" dirty="0"/>
+            </a:br>
+            <a:r>
+              <a:rPr lang="en-US" dirty="0" err="1"/>
+              <a:t>Chúng</a:t>
+            </a:r>
+            <a:r>
+              <a:rPr lang="en-US" dirty="0"/>
+              <a:t> </a:t>
+            </a:r>
+            <a:r>
+              <a:rPr lang="en-US" dirty="0" err="1"/>
+              <a:t>tôi</a:t>
+            </a:r>
+            <a:r>
+              <a:rPr lang="en-US" dirty="0"/>
+              <a:t> </a:t>
+            </a:r>
+            <a:r>
+              <a:rPr lang="en-US" dirty="0" err="1"/>
+              <a:t>hệ</a:t>
+            </a:r>
+            <a:r>
+              <a:rPr lang="en-US" dirty="0"/>
+              <a:t> </a:t>
+            </a:r>
+            <a:r>
+              <a:rPr lang="en-US" dirty="0" err="1"/>
+              <a:t>thống</a:t>
+            </a:r>
+            <a:r>
+              <a:rPr lang="en-US" dirty="0"/>
+              <a:t> </a:t>
+            </a:r>
+            <a:r>
+              <a:rPr lang="en-US" dirty="0" err="1"/>
+              <a:t>lớp</a:t>
+            </a:r>
+            <a:r>
+              <a:rPr lang="en-US" dirty="0"/>
+              <a:t> </a:t>
+            </a:r>
+            <a:r>
+              <a:rPr lang="en-US" dirty="0" err="1"/>
+              <a:t>học</a:t>
+            </a:r>
+            <a:r>
+              <a:rPr lang="en-US" dirty="0"/>
+              <a:t> </a:t>
+            </a:r>
+            <a:r>
+              <a:rPr lang="en-US" dirty="0" err="1"/>
+              <a:t>trực</a:t>
+            </a:r>
+            <a:r>
+              <a:rPr lang="en-US" dirty="0"/>
+              <a:t> </a:t>
+            </a:r>
+            <a:r>
+              <a:rPr lang="en-US" dirty="0" err="1"/>
+              <a:t>tuyến</a:t>
+            </a:r>
+            <a:r>
+              <a:rPr lang="en-US" dirty="0"/>
+              <a:t> </a:t>
+            </a:r>
+            <a:r>
+              <a:rPr lang="en-US" dirty="0" err="1"/>
+              <a:t>với</a:t>
+            </a:r>
+            <a:r>
+              <a:rPr lang="en-US" dirty="0"/>
+              <a:t> h</a:t>
+            </a:r>
+            <a:r>
+              <a:rPr lang="vi-VN" dirty="0"/>
+              <a:t>ơ</a:t>
+            </a:r>
+            <a:r>
+              <a:rPr lang="en-US" dirty="0"/>
+              <a:t>n </a:t>
+            </a:r>
+            <a:r>
+              <a:rPr lang="en-US" dirty="0" err="1"/>
+              <a:t>xxxx</a:t>
+            </a:r>
+            <a:r>
+              <a:rPr lang="en-US" dirty="0"/>
+              <a:t> </a:t>
+            </a:r>
+            <a:r>
+              <a:rPr lang="en-US" dirty="0" err="1"/>
+              <a:t>giảng</a:t>
+            </a:r>
+            <a:r>
+              <a:rPr lang="en-US" dirty="0"/>
+              <a:t> </a:t>
+            </a:r>
+            <a:r>
+              <a:rPr lang="en-US" dirty="0" err="1"/>
+              <a:t>viên</a:t>
+            </a:r>
+            <a:r>
+              <a:rPr lang="en-US" dirty="0"/>
+              <a:t> </a:t>
+            </a:r>
+            <a:r>
+              <a:rPr lang="en-US" dirty="0" err="1"/>
+              <a:t>và</a:t>
+            </a:r>
+            <a:r>
+              <a:rPr lang="en-US" dirty="0"/>
+              <a:t> </a:t>
+            </a:r>
+            <a:r>
+              <a:rPr lang="en-US" dirty="0" err="1"/>
+              <a:t>với</a:t>
+            </a:r>
+            <a:r>
+              <a:rPr lang="en-US" dirty="0"/>
+              <a:t> </a:t>
+            </a:r>
+            <a:r>
+              <a:rPr lang="en-US" dirty="0" err="1"/>
+              <a:t>hơn</a:t>
+            </a:r>
+            <a:r>
+              <a:rPr lang="en-US" dirty="0"/>
+              <a:t> </a:t>
+            </a:r>
+            <a:r>
+              <a:rPr lang="en-US" dirty="0" err="1"/>
+              <a:t>xxxx</a:t>
+            </a:r>
+            <a:r>
+              <a:rPr lang="en-US" dirty="0"/>
+              <a:t> </a:t>
+            </a:r>
+            <a:r>
+              <a:rPr lang="en-US" dirty="0" err="1"/>
+              <a:t>các</a:t>
+            </a:r>
+            <a:r>
+              <a:rPr lang="en-US" dirty="0"/>
+              <a:t> </a:t>
+            </a:r>
+            <a:r>
+              <a:rPr lang="en-US" dirty="0" err="1"/>
+              <a:t>học</a:t>
+            </a:r>
+            <a:r>
+              <a:rPr lang="en-US" dirty="0"/>
+              <a:t> </a:t>
+            </a:r>
+            <a:r>
+              <a:rPr lang="en-US" dirty="0" err="1"/>
+              <a:t>viện</a:t>
+            </a:r>
+            <a:r>
+              <a:rPr lang="en-US" dirty="0"/>
+              <a:t> </a:t>
+            </a:r>
+            <a:r>
+              <a:rPr lang="en-US" dirty="0" err="1"/>
+              <a:t>đang</a:t>
+            </a:r>
+            <a:r>
+              <a:rPr lang="en-US" dirty="0"/>
+              <a:t> </a:t>
+            </a:r>
+            <a:r>
+              <a:rPr lang="en-US" dirty="0" err="1"/>
+              <a:t>theo</a:t>
+            </a:r>
+            <a:r>
+              <a:rPr lang="en-US" dirty="0"/>
+              <a:t> </a:t>
+            </a:r>
+            <a:r>
+              <a:rPr lang="en-US" dirty="0" err="1"/>
+              <a:t>học</a:t>
+            </a:r>
+            <a:r>
+              <a:rPr lang="en-US" dirty="0"/>
+              <a:t>, </a:t>
+            </a:r>
+            <a:r>
+              <a:rPr lang="en-US" dirty="0" err="1"/>
+              <a:t>Đến</a:t>
+            </a:r>
+            <a:r>
+              <a:rPr lang="en-US" dirty="0"/>
+              <a:t> </a:t>
+            </a:r>
+            <a:r>
+              <a:rPr lang="en-US" dirty="0" err="1"/>
+              <a:t>đây</a:t>
+            </a:r>
+            <a:r>
+              <a:rPr lang="en-US" dirty="0"/>
+              <a:t> </a:t>
+            </a:r>
+            <a:r>
+              <a:rPr lang="en-US" dirty="0" err="1"/>
+              <a:t>chúng</a:t>
+            </a:r>
+            <a:r>
+              <a:rPr lang="en-US" dirty="0"/>
+              <a:t> </a:t>
+            </a:r>
+            <a:r>
+              <a:rPr lang="en-US" dirty="0" err="1"/>
+              <a:t>tôi</a:t>
+            </a:r>
+            <a:r>
+              <a:rPr lang="en-US" dirty="0"/>
+              <a:t> </a:t>
+            </a:r>
+            <a:r>
+              <a:rPr lang="en-US" dirty="0" err="1"/>
+              <a:t>sẽ</a:t>
+            </a:r>
+            <a:r>
+              <a:rPr lang="en-US" dirty="0"/>
+              <a:t> </a:t>
+            </a:r>
+            <a:r>
+              <a:rPr lang="en-US" dirty="0" err="1"/>
+              <a:t>hỗ</a:t>
+            </a:r>
+            <a:r>
+              <a:rPr lang="en-US" dirty="0"/>
+              <a:t> </a:t>
+            </a:r>
+            <a:r>
+              <a:rPr lang="en-US" dirty="0" err="1"/>
+              <a:t>trợ</a:t>
+            </a:r>
+            <a:r>
+              <a:rPr lang="en-US" dirty="0"/>
+              <a:t> </a:t>
+            </a:r>
+            <a:r>
+              <a:rPr lang="en-US" dirty="0" err="1"/>
+              <a:t>bạn</a:t>
+            </a:r>
+            <a:r>
+              <a:rPr lang="en-US" dirty="0"/>
+              <a:t> </a:t>
+            </a:r>
+            <a:r>
+              <a:rPr lang="en-US" dirty="0" err="1"/>
+              <a:t>giải</a:t>
+            </a:r>
+            <a:r>
+              <a:rPr lang="en-US" dirty="0"/>
+              <a:t> </a:t>
+            </a:r>
+            <a:r>
+              <a:rPr lang="en-US" dirty="0" err="1"/>
+              <a:t>quyết</a:t>
+            </a:r>
+            <a:r>
+              <a:rPr lang="en-US" dirty="0"/>
+              <a:t> </a:t>
+            </a:r>
+            <a:r>
+              <a:rPr lang="en-US" dirty="0" err="1"/>
+              <a:t>các</a:t>
+            </a:r>
+            <a:r>
+              <a:rPr lang="en-US" dirty="0"/>
+              <a:t> </a:t>
+            </a:r>
+            <a:r>
+              <a:rPr lang="en-US" dirty="0" err="1"/>
+              <a:t>tất</a:t>
+            </a:r>
+            <a:r>
+              <a:rPr lang="en-US" dirty="0"/>
+              <a:t> </a:t>
+            </a:r>
+            <a:r>
+              <a:rPr lang="en-US" dirty="0" err="1"/>
+              <a:t>cả</a:t>
+            </a:r>
+            <a:r>
+              <a:rPr lang="en-US" dirty="0"/>
+              <a:t> </a:t>
+            </a:r>
+            <a:r>
+              <a:rPr lang="en-US" dirty="0" err="1"/>
+              <a:t>những</a:t>
+            </a:r>
+            <a:r>
+              <a:rPr lang="en-US" dirty="0"/>
+              <a:t> </a:t>
+            </a:r>
+            <a:r>
+              <a:rPr lang="en-US" dirty="0" err="1"/>
+              <a:t>khó</a:t>
+            </a:r>
+            <a:r>
+              <a:rPr lang="en-US" dirty="0"/>
+              <a:t> </a:t>
+            </a:r>
+            <a:r>
+              <a:rPr lang="en-US" dirty="0" err="1"/>
+              <a:t>khăn</a:t>
+            </a:r>
+            <a:r>
+              <a:rPr lang="en-US" dirty="0"/>
+              <a:t> </a:t>
+            </a:r>
+            <a:r>
+              <a:rPr lang="en-US" dirty="0" err="1"/>
+              <a:t>kể</a:t>
+            </a:r>
+            <a:r>
+              <a:rPr lang="en-US" dirty="0"/>
+              <a:t> </a:t>
+            </a:r>
+            <a:r>
+              <a:rPr lang="en-US" dirty="0" err="1"/>
+              <a:t>trên</a:t>
+            </a:r>
+            <a:r>
+              <a:rPr lang="en-US" dirty="0"/>
+              <a:t> </a:t>
+            </a:r>
+            <a:r>
+              <a:rPr lang="en-US" dirty="0" err="1"/>
+              <a:t>của</a:t>
+            </a:r>
+            <a:r>
+              <a:rPr lang="en-US" dirty="0"/>
+              <a:t> </a:t>
+            </a:r>
+            <a:r>
+              <a:rPr lang="en-US" dirty="0" err="1"/>
+              <a:t>bạn</a:t>
+            </a:r>
+            <a:r>
+              <a:rPr lang="en-US" dirty="0"/>
+              <a:t> </a:t>
+            </a:r>
+            <a:r>
+              <a:rPr lang="en-US" dirty="0" err="1"/>
+              <a:t>bằng</a:t>
+            </a:r>
+            <a:r>
+              <a:rPr lang="en-US" dirty="0"/>
+              <a:t> </a:t>
+            </a:r>
+            <a:r>
+              <a:rPr lang="en-US" dirty="0" err="1"/>
+              <a:t>các</a:t>
+            </a:r>
+            <a:r>
+              <a:rPr lang="en-US" dirty="0"/>
+              <a:t> </a:t>
+            </a:r>
+            <a:r>
+              <a:rPr lang="en-US" dirty="0" err="1"/>
+              <a:t>công</a:t>
+            </a:r>
+            <a:r>
+              <a:rPr lang="en-US" dirty="0"/>
+              <a:t> </a:t>
+            </a:r>
+            <a:r>
+              <a:rPr lang="en-US" dirty="0" err="1"/>
+              <a:t>nghệ</a:t>
+            </a:r>
+            <a:r>
+              <a:rPr lang="en-US" dirty="0"/>
+              <a:t> </a:t>
+            </a:r>
+            <a:r>
+              <a:rPr lang="en-US" dirty="0" err="1"/>
+              <a:t>hiện</a:t>
+            </a:r>
+            <a:r>
+              <a:rPr lang="en-US" dirty="0"/>
+              <a:t> </a:t>
+            </a:r>
+            <a:r>
+              <a:rPr lang="en-US" dirty="0" err="1"/>
+              <a:t>đại</a:t>
+            </a:r>
+            <a:r>
+              <a:rPr lang="en-US" dirty="0"/>
+              <a:t> </a:t>
+            </a:r>
+            <a:r>
+              <a:rPr lang="en-US" dirty="0" err="1"/>
+              <a:t>và</a:t>
+            </a:r>
+            <a:r>
+              <a:rPr lang="en-US" dirty="0"/>
+              <a:t> </a:t>
+            </a:r>
+            <a:r>
+              <a:rPr lang="en-US" dirty="0" err="1"/>
+              <a:t>chuyên</a:t>
+            </a:r>
+            <a:r>
+              <a:rPr lang="en-US" dirty="0"/>
+              <a:t> </a:t>
+            </a:r>
+            <a:r>
+              <a:rPr lang="en-US" dirty="0" err="1"/>
+              <a:t>nghiệp</a:t>
+            </a:r>
+            <a:r>
+              <a:rPr lang="en-US" dirty="0"/>
+              <a:t> </a:t>
+            </a:r>
+            <a:r>
+              <a:rPr lang="en-US" dirty="0" err="1"/>
+              <a:t>nhất</a:t>
+            </a:r>
+            <a:endParaRPr lang="en-US" dirty="0"/>
+          </a:p>
+        </p:txBody>
+      </p:sp>
+    </p:spTree>
+    <p:extLst>
+      <p:ext uri="{BB962C8B-B14F-4D97-AF65-F5344CB8AC3E}">
+        <p14:creationId xmlns:p14="http://schemas.microsoft.com/office/powerpoint/2010/main" val="2922871834"/>
+      </p:ext>
+    </p:extLst>
+  </p:cSld>
+  <p:clrMapOvr>
+    <a:masterClrMapping/>
+  </p:clrMapOvr>
+</p:sld>
+</file>
+
+<file path=ppt/slides/slide3.xml><?xml version="1.0" encoding="utf-8"?>
+<p:sld xmlns:a="http://schemas.openxmlformats.org/drawingml/2006/main" xmlns:r="http://schemas.openxmlformats.org/officeDocument/2006/relationships" xmlns:p="http://schemas.openxmlformats.org/presentationml/2006/main">
+  <p:cSld>
+    <p:spTree>
+      <p:nvGrpSpPr>
+        <p:cNvPr id="1" name=""/>
+        <p:cNvGrpSpPr/>
+        <p:nvPr/>
+      </p:nvGrpSpPr>
+      <p:grpSpPr>
+        <a:xfrm>
+          <a:off x="0" y="0"/>
+          <a:ext cx="0" cy="0"/>
+          <a:chOff x="0" y="0"/>
+          <a:chExt cx="0" cy="0"/>
+        </a:xfrm>
+      </p:grpSpPr>
+      <p:sp>
+        <p:nvSpPr>
           <p:cNvPr id="8" name="TextBox 7">
             <a:extLst>
               <a:ext uri="{FF2B5EF4-FFF2-40B4-BE49-F238E27FC236}">
@@ -4501,7 +5512,2940 @@
 </p:sld>
 </file>
 
-<file path=ppt/slides/slide3.xml><?xml version="1.0" encoding="utf-8"?>
+<file path=ppt/slides/slide4.xml><?xml version="1.0" encoding="utf-8"?>
+<p:sld xmlns:a="http://schemas.openxmlformats.org/drawingml/2006/main" xmlns:r="http://schemas.openxmlformats.org/officeDocument/2006/relationships" xmlns:p="http://schemas.openxmlformats.org/presentationml/2006/main">
+  <p:cSld>
+    <p:spTree>
+      <p:nvGrpSpPr>
+        <p:cNvPr id="1" name=""/>
+        <p:cNvGrpSpPr/>
+        <p:nvPr/>
+      </p:nvGrpSpPr>
+      <p:grpSpPr>
+        <a:xfrm>
+          <a:off x="0" y="0"/>
+          <a:ext cx="0" cy="0"/>
+          <a:chOff x="0" y="0"/>
+          <a:chExt cx="0" cy="0"/>
+        </a:xfrm>
+      </p:grpSpPr>
+      <p:sp>
+        <p:nvSpPr>
+          <p:cNvPr id="4" name="TextBox 3">
+            <a:extLst>
+              <a:ext uri="{FF2B5EF4-FFF2-40B4-BE49-F238E27FC236}">
+                <a16:creationId xmlns:a16="http://schemas.microsoft.com/office/drawing/2014/main" id="{24D6B6E4-6A2C-4822-A0D5-0CE0DDACF32D}"/>
+              </a:ext>
+            </a:extLst>
+          </p:cNvPr>
+          <p:cNvSpPr txBox="1"/>
+          <p:nvPr/>
+        </p:nvSpPr>
+        <p:spPr>
+          <a:xfrm>
+            <a:off x="4080457" y="536379"/>
+            <a:ext cx="4226419" cy="646331"/>
+          </a:xfrm>
+          <a:prstGeom prst="rect">
+            <a:avLst/>
+          </a:prstGeom>
+          <a:noFill/>
+        </p:spPr>
+        <p:txBody>
+          <a:bodyPr wrap="square" rtlCol="0">
+            <a:spAutoFit/>
+          </a:bodyPr>
+          <a:lstStyle/>
+          <a:p>
+            <a:pPr algn="ctr"/>
+            <a:r>
+              <a:rPr lang="en-US" sz="3600" dirty="0"/>
+              <a:t>SERVICES</a:t>
+            </a:r>
+          </a:p>
+        </p:txBody>
+      </p:sp>
+      <p:cxnSp>
+        <p:nvCxnSpPr>
+          <p:cNvPr id="5" name="Straight Connector 4">
+            <a:extLst>
+              <a:ext uri="{FF2B5EF4-FFF2-40B4-BE49-F238E27FC236}">
+                <a16:creationId xmlns:a16="http://schemas.microsoft.com/office/drawing/2014/main" id="{A05709EE-DC37-488B-87A0-C50B893A3765}"/>
+              </a:ext>
+            </a:extLst>
+          </p:cNvPr>
+          <p:cNvCxnSpPr>
+            <a:cxnSpLocks/>
+          </p:cNvCxnSpPr>
+          <p:nvPr/>
+        </p:nvCxnSpPr>
+        <p:spPr>
+          <a:xfrm>
+            <a:off x="4893972" y="1287885"/>
+            <a:ext cx="865517" cy="0"/>
+          </a:xfrm>
+          <a:prstGeom prst="line">
+            <a:avLst/>
+          </a:prstGeom>
+          <a:ln w="38100"/>
+        </p:spPr>
+        <p:style>
+          <a:lnRef idx="1">
+            <a:schemeClr val="accent1"/>
+          </a:lnRef>
+          <a:fillRef idx="0">
+            <a:schemeClr val="accent1"/>
+          </a:fillRef>
+          <a:effectRef idx="0">
+            <a:schemeClr val="accent1"/>
+          </a:effectRef>
+          <a:fontRef idx="minor">
+            <a:schemeClr val="tx1"/>
+          </a:fontRef>
+        </p:style>
+      </p:cxnSp>
+      <p:cxnSp>
+        <p:nvCxnSpPr>
+          <p:cNvPr id="6" name="Straight Connector 5">
+            <a:extLst>
+              <a:ext uri="{FF2B5EF4-FFF2-40B4-BE49-F238E27FC236}">
+                <a16:creationId xmlns:a16="http://schemas.microsoft.com/office/drawing/2014/main" id="{3045E4EC-6FA5-4EEF-B322-834285C777A5}"/>
+              </a:ext>
+            </a:extLst>
+          </p:cNvPr>
+          <p:cNvCxnSpPr>
+            <a:cxnSpLocks/>
+          </p:cNvCxnSpPr>
+          <p:nvPr/>
+        </p:nvCxnSpPr>
+        <p:spPr>
+          <a:xfrm>
+            <a:off x="6501685" y="1287885"/>
+            <a:ext cx="865517" cy="0"/>
+          </a:xfrm>
+          <a:prstGeom prst="line">
+            <a:avLst/>
+          </a:prstGeom>
+          <a:ln w="38100"/>
+        </p:spPr>
+        <p:style>
+          <a:lnRef idx="1">
+            <a:schemeClr val="accent1"/>
+          </a:lnRef>
+          <a:fillRef idx="0">
+            <a:schemeClr val="accent1"/>
+          </a:fillRef>
+          <a:effectRef idx="0">
+            <a:schemeClr val="accent1"/>
+          </a:effectRef>
+          <a:fontRef idx="minor">
+            <a:schemeClr val="tx1"/>
+          </a:fontRef>
+        </p:style>
+      </p:cxnSp>
+      <p:pic>
+        <p:nvPicPr>
+          <p:cNvPr id="7" name="Picture 6" descr="Kết quả hình ảnh cho book icon">
+            <a:extLst>
+              <a:ext uri="{FF2B5EF4-FFF2-40B4-BE49-F238E27FC236}">
+                <a16:creationId xmlns:a16="http://schemas.microsoft.com/office/drawing/2014/main" id="{B4023D0A-71F8-46ED-93A1-771DB1A01AE5}"/>
+              </a:ext>
+            </a:extLst>
+          </p:cNvPr>
+          <p:cNvPicPr>
+            <a:picLocks noChangeAspect="1" noChangeArrowheads="1"/>
+          </p:cNvPicPr>
+          <p:nvPr/>
+        </p:nvPicPr>
+        <p:blipFill>
+          <a:blip r:embed="rId2">
+            <a:extLst>
+              <a:ext uri="{28A0092B-C50C-407E-A947-70E740481C1C}">
+                <a14:useLocalDpi xmlns:a14="http://schemas.microsoft.com/office/drawing/2010/main" val="0"/>
+              </a:ext>
+            </a:extLst>
+          </a:blip>
+          <a:srcRect/>
+          <a:stretch>
+            <a:fillRect/>
+          </a:stretch>
+        </p:blipFill>
+        <p:spPr bwMode="auto">
+          <a:xfrm>
+            <a:off x="5979018" y="1105434"/>
+            <a:ext cx="318480" cy="364901"/>
+          </a:xfrm>
+          <a:prstGeom prst="rect">
+            <a:avLst/>
+          </a:prstGeom>
+          <a:noFill/>
+          <a:extLst>
+            <a:ext uri="{909E8E84-426E-40DD-AFC4-6F175D3DCCD1}">
+              <a14:hiddenFill xmlns:a14="http://schemas.microsoft.com/office/drawing/2010/main">
+                <a:solidFill>
+                  <a:srgbClr val="FFFFFF"/>
+                </a:solidFill>
+              </a14:hiddenFill>
+            </a:ext>
+          </a:extLst>
+        </p:spPr>
+      </p:pic>
+      <p:grpSp>
+        <p:nvGrpSpPr>
+          <p:cNvPr id="28" name="Group 27">
+            <a:extLst>
+              <a:ext uri="{FF2B5EF4-FFF2-40B4-BE49-F238E27FC236}">
+                <a16:creationId xmlns:a16="http://schemas.microsoft.com/office/drawing/2014/main" id="{6B93B8F8-8DDA-45AA-AF27-86D841E411B2}"/>
+              </a:ext>
+            </a:extLst>
+          </p:cNvPr>
+          <p:cNvGrpSpPr/>
+          <p:nvPr/>
+        </p:nvGrpSpPr>
+        <p:grpSpPr>
+          <a:xfrm>
+            <a:off x="759746" y="1925315"/>
+            <a:ext cx="3345968" cy="4148914"/>
+            <a:chOff x="297985" y="1951631"/>
+            <a:chExt cx="3345968" cy="4148914"/>
+          </a:xfrm>
+        </p:grpSpPr>
+        <p:sp>
+          <p:nvSpPr>
+            <p:cNvPr id="8" name="Rectangle: Rounded Corners 7">
+              <a:extLst>
+                <a:ext uri="{FF2B5EF4-FFF2-40B4-BE49-F238E27FC236}">
+                  <a16:creationId xmlns:a16="http://schemas.microsoft.com/office/drawing/2014/main" id="{C5B77E1E-9A51-40F6-8337-329382BC35C2}"/>
+                </a:ext>
+              </a:extLst>
+            </p:cNvPr>
+            <p:cNvSpPr/>
+            <p:nvPr/>
+          </p:nvSpPr>
+          <p:spPr>
+            <a:xfrm>
+              <a:off x="297985" y="1951631"/>
+              <a:ext cx="3345968" cy="4148914"/>
+            </a:xfrm>
+            <a:prstGeom prst="roundRect">
+              <a:avLst>
+                <a:gd name="adj" fmla="val 3659"/>
+              </a:avLst>
+            </a:prstGeom>
+          </p:spPr>
+          <p:style>
+            <a:lnRef idx="2">
+              <a:schemeClr val="accent6"/>
+            </a:lnRef>
+            <a:fillRef idx="1">
+              <a:schemeClr val="lt1"/>
+            </a:fillRef>
+            <a:effectRef idx="0">
+              <a:schemeClr val="accent6"/>
+            </a:effectRef>
+            <a:fontRef idx="minor">
+              <a:schemeClr val="dk1"/>
+            </a:fontRef>
+          </p:style>
+          <p:txBody>
+            <a:bodyPr rtlCol="0" anchor="ctr"/>
+            <a:lstStyle/>
+            <a:p>
+              <a:pPr algn="ctr"/>
+              <a:endParaRPr lang="en-US" dirty="0"/>
+            </a:p>
+          </p:txBody>
+        </p:sp>
+        <p:sp>
+          <p:nvSpPr>
+            <p:cNvPr id="9" name="Diamond 8">
+              <a:extLst>
+                <a:ext uri="{FF2B5EF4-FFF2-40B4-BE49-F238E27FC236}">
+                  <a16:creationId xmlns:a16="http://schemas.microsoft.com/office/drawing/2014/main" id="{0F35646E-1371-40B3-A1A9-CA5477FBF931}"/>
+                </a:ext>
+              </a:extLst>
+            </p:cNvPr>
+            <p:cNvSpPr/>
+            <p:nvPr/>
+          </p:nvSpPr>
+          <p:spPr>
+            <a:xfrm>
+              <a:off x="1575902" y="2186716"/>
+              <a:ext cx="865882" cy="876869"/>
+            </a:xfrm>
+            <a:prstGeom prst="diamond">
+              <a:avLst/>
+            </a:prstGeom>
+          </p:spPr>
+          <p:style>
+            <a:lnRef idx="2">
+              <a:schemeClr val="accent2">
+                <a:shade val="50000"/>
+              </a:schemeClr>
+            </a:lnRef>
+            <a:fillRef idx="1">
+              <a:schemeClr val="accent2"/>
+            </a:fillRef>
+            <a:effectRef idx="0">
+              <a:schemeClr val="accent2"/>
+            </a:effectRef>
+            <a:fontRef idx="minor">
+              <a:schemeClr val="lt1"/>
+            </a:fontRef>
+          </p:style>
+          <p:txBody>
+            <a:bodyPr rtlCol="0" anchor="ctr"/>
+            <a:lstStyle/>
+            <a:p>
+              <a:pPr algn="ctr"/>
+              <a:endParaRPr lang="en-US"/>
+            </a:p>
+          </p:txBody>
+        </p:sp>
+        <p:sp>
+          <p:nvSpPr>
+            <p:cNvPr id="10" name="TextBox 9">
+              <a:extLst>
+                <a:ext uri="{FF2B5EF4-FFF2-40B4-BE49-F238E27FC236}">
+                  <a16:creationId xmlns:a16="http://schemas.microsoft.com/office/drawing/2014/main" id="{83430E2E-B2F5-4F3A-A78E-CA16A9720816}"/>
+                </a:ext>
+              </a:extLst>
+            </p:cNvPr>
+            <p:cNvSpPr txBox="1"/>
+            <p:nvPr/>
+          </p:nvSpPr>
+          <p:spPr>
+            <a:xfrm>
+              <a:off x="707641" y="3196144"/>
+              <a:ext cx="2936312" cy="369332"/>
+            </a:xfrm>
+            <a:prstGeom prst="rect">
+              <a:avLst/>
+            </a:prstGeom>
+            <a:noFill/>
+          </p:spPr>
+          <p:txBody>
+            <a:bodyPr wrap="square" rtlCol="0">
+              <a:spAutoFit/>
+            </a:bodyPr>
+            <a:lstStyle/>
+            <a:p>
+              <a:r>
+                <a:rPr lang="en-US" b="1" dirty="0"/>
+                <a:t>SUPPORT FOR STUDENT</a:t>
+              </a:r>
+            </a:p>
+          </p:txBody>
+        </p:sp>
+        <p:sp>
+          <p:nvSpPr>
+            <p:cNvPr id="11" name="Rectangle: Rounded Corners 10">
+              <a:extLst>
+                <a:ext uri="{FF2B5EF4-FFF2-40B4-BE49-F238E27FC236}">
+                  <a16:creationId xmlns:a16="http://schemas.microsoft.com/office/drawing/2014/main" id="{C83B301B-D1D7-4DD7-8DD1-EA674EBE8747}"/>
+                </a:ext>
+              </a:extLst>
+            </p:cNvPr>
+            <p:cNvSpPr/>
+            <p:nvPr/>
+          </p:nvSpPr>
+          <p:spPr>
+            <a:xfrm>
+              <a:off x="1062554" y="5280704"/>
+              <a:ext cx="1810482" cy="436087"/>
+            </a:xfrm>
+            <a:prstGeom prst="roundRect">
+              <a:avLst/>
+            </a:prstGeom>
+            <a:noFill/>
+            <a:ln>
+              <a:solidFill>
+                <a:schemeClr val="accent2"/>
+              </a:solidFill>
+            </a:ln>
+          </p:spPr>
+          <p:style>
+            <a:lnRef idx="0">
+              <a:scrgbClr r="0" g="0" b="0"/>
+            </a:lnRef>
+            <a:fillRef idx="0">
+              <a:scrgbClr r="0" g="0" b="0"/>
+            </a:fillRef>
+            <a:effectRef idx="0">
+              <a:scrgbClr r="0" g="0" b="0"/>
+            </a:effectRef>
+            <a:fontRef idx="minor">
+              <a:schemeClr val="accent2"/>
+            </a:fontRef>
+          </p:style>
+          <p:txBody>
+            <a:bodyPr rtlCol="0" anchor="ctr"/>
+            <a:lstStyle/>
+            <a:p>
+              <a:pPr algn="ctr"/>
+              <a:r>
+                <a:rPr lang="en-US" sz="1600" dirty="0"/>
+                <a:t>READ MORE</a:t>
+              </a:r>
+            </a:p>
+          </p:txBody>
+        </p:sp>
+        <p:sp>
+          <p:nvSpPr>
+            <p:cNvPr id="12" name="Rectangle 11">
+              <a:extLst>
+                <a:ext uri="{FF2B5EF4-FFF2-40B4-BE49-F238E27FC236}">
+                  <a16:creationId xmlns:a16="http://schemas.microsoft.com/office/drawing/2014/main" id="{228AAB72-F11E-4E44-B417-24B3F39BF593}"/>
+                </a:ext>
+              </a:extLst>
+            </p:cNvPr>
+            <p:cNvSpPr/>
+            <p:nvPr/>
+          </p:nvSpPr>
+          <p:spPr>
+            <a:xfrm>
+              <a:off x="499639" y="3829991"/>
+              <a:ext cx="2936312" cy="830997"/>
+            </a:xfrm>
+            <a:prstGeom prst="rect">
+              <a:avLst/>
+            </a:prstGeom>
+          </p:spPr>
+          <p:txBody>
+            <a:bodyPr wrap="square">
+              <a:spAutoFit/>
+            </a:bodyPr>
+            <a:lstStyle/>
+            <a:p>
+              <a:pPr algn="just"/>
+              <a:r>
+                <a:rPr lang="en-US" sz="1600" dirty="0">
+                  <a:solidFill>
+                    <a:srgbClr val="222222"/>
+                  </a:solidFill>
+                </a:rPr>
+                <a:t>Lorem Ipsum. </a:t>
+              </a:r>
+              <a:r>
+                <a:rPr lang="en-US" sz="1600" dirty="0" err="1">
+                  <a:solidFill>
+                    <a:srgbClr val="222222"/>
+                  </a:solidFill>
+                </a:rPr>
+                <a:t>Proin</a:t>
+              </a:r>
+              <a:r>
+                <a:rPr lang="en-US" sz="1600" dirty="0">
+                  <a:solidFill>
+                    <a:srgbClr val="222222"/>
+                  </a:solidFill>
+                </a:rPr>
+                <a:t> gravida </a:t>
+              </a:r>
+              <a:r>
+                <a:rPr lang="en-US" sz="1600" dirty="0" err="1">
+                  <a:solidFill>
+                    <a:srgbClr val="222222"/>
+                  </a:solidFill>
+                </a:rPr>
+                <a:t>nibh</a:t>
+              </a:r>
+              <a:r>
+                <a:rPr lang="en-US" sz="1600" dirty="0">
+                  <a:solidFill>
+                    <a:srgbClr val="222222"/>
+                  </a:solidFill>
+                </a:rPr>
+                <a:t> vel </a:t>
+              </a:r>
+              <a:r>
+                <a:rPr lang="en-US" sz="1600" dirty="0" err="1">
+                  <a:solidFill>
+                    <a:srgbClr val="222222"/>
+                  </a:solidFill>
+                </a:rPr>
+                <a:t>velit</a:t>
+              </a:r>
+              <a:r>
+                <a:rPr lang="en-US" sz="1600" dirty="0">
+                  <a:solidFill>
+                    <a:srgbClr val="222222"/>
+                  </a:solidFill>
+                </a:rPr>
+                <a:t> </a:t>
+              </a:r>
+              <a:r>
+                <a:rPr lang="en-US" sz="1600" dirty="0" err="1">
+                  <a:solidFill>
+                    <a:srgbClr val="222222"/>
+                  </a:solidFill>
+                </a:rPr>
+                <a:t>auctor</a:t>
+              </a:r>
+              <a:r>
+                <a:rPr lang="en-US" sz="1600" dirty="0">
+                  <a:solidFill>
+                    <a:srgbClr val="222222"/>
+                  </a:solidFill>
+                </a:rPr>
+                <a:t> </a:t>
+              </a:r>
+              <a:r>
+                <a:rPr lang="en-US" sz="1600" dirty="0" err="1">
+                  <a:solidFill>
+                    <a:srgbClr val="222222"/>
+                  </a:solidFill>
+                </a:rPr>
+                <a:t>aliquet</a:t>
+              </a:r>
+              <a:r>
+                <a:rPr lang="en-US" sz="1600" dirty="0">
+                  <a:solidFill>
+                    <a:srgbClr val="222222"/>
+                  </a:solidFill>
+                </a:rPr>
+                <a:t>. </a:t>
+              </a:r>
+              <a:r>
+                <a:rPr lang="en-US" sz="1600" dirty="0" err="1">
+                  <a:solidFill>
+                    <a:srgbClr val="222222"/>
+                  </a:solidFill>
+                </a:rPr>
+                <a:t>Aenean</a:t>
+              </a:r>
+              <a:r>
+                <a:rPr lang="en-US" sz="1600" dirty="0">
+                  <a:solidFill>
+                    <a:srgbClr val="222222"/>
+                  </a:solidFill>
+                </a:rPr>
+                <a:t> </a:t>
+              </a:r>
+              <a:r>
+                <a:rPr lang="en-US" sz="1600" dirty="0" err="1">
+                  <a:solidFill>
+                    <a:srgbClr val="222222"/>
+                  </a:solidFill>
+                </a:rPr>
+                <a:t>sollicitudin</a:t>
+              </a:r>
+              <a:r>
+                <a:rPr lang="en-US" sz="1600" dirty="0">
+                  <a:solidFill>
+                    <a:srgbClr val="222222"/>
+                  </a:solidFill>
+                </a:rPr>
+                <a:t>, lorem </a:t>
+              </a:r>
+              <a:r>
+                <a:rPr lang="en-US" sz="1600" dirty="0" err="1">
+                  <a:solidFill>
+                    <a:srgbClr val="222222"/>
+                  </a:solidFill>
+                </a:rPr>
+                <a:t>quis</a:t>
+              </a:r>
+              <a:r>
+                <a:rPr lang="en-US" sz="1600" dirty="0">
+                  <a:solidFill>
+                    <a:srgbClr val="222222"/>
+                  </a:solidFill>
+                </a:rPr>
+                <a:t> </a:t>
+              </a:r>
+              <a:r>
+                <a:rPr lang="en-US" sz="1600" dirty="0" err="1">
+                  <a:solidFill>
+                    <a:srgbClr val="222222"/>
+                  </a:solidFill>
+                </a:rPr>
+                <a:t>bibend</a:t>
+              </a:r>
+              <a:r>
+                <a:rPr lang="en-US" sz="1600" dirty="0">
+                  <a:solidFill>
+                    <a:srgbClr val="222222"/>
+                  </a:solidFill>
+                </a:rPr>
+                <a:t>.</a:t>
+              </a:r>
+              <a:endParaRPr lang="en-US" sz="1600" dirty="0"/>
+            </a:p>
+          </p:txBody>
+        </p:sp>
+      </p:grpSp>
+      <p:grpSp>
+        <p:nvGrpSpPr>
+          <p:cNvPr id="29" name="Group 28">
+            <a:extLst>
+              <a:ext uri="{FF2B5EF4-FFF2-40B4-BE49-F238E27FC236}">
+                <a16:creationId xmlns:a16="http://schemas.microsoft.com/office/drawing/2014/main" id="{7F86EF5C-3E1A-4A93-92E9-91ED073F66FB}"/>
+              </a:ext>
+            </a:extLst>
+          </p:cNvPr>
+          <p:cNvGrpSpPr/>
+          <p:nvPr/>
+        </p:nvGrpSpPr>
+        <p:grpSpPr>
+          <a:xfrm>
+            <a:off x="8080743" y="1907934"/>
+            <a:ext cx="3345968" cy="4148914"/>
+            <a:chOff x="297985" y="1951631"/>
+            <a:chExt cx="3345968" cy="4148914"/>
+          </a:xfrm>
+        </p:grpSpPr>
+        <p:sp>
+          <p:nvSpPr>
+            <p:cNvPr id="30" name="Rectangle: Rounded Corners 29">
+              <a:extLst>
+                <a:ext uri="{FF2B5EF4-FFF2-40B4-BE49-F238E27FC236}">
+                  <a16:creationId xmlns:a16="http://schemas.microsoft.com/office/drawing/2014/main" id="{0CDD0FB6-8FDB-4DFB-BF7D-1E53018C5A7D}"/>
+                </a:ext>
+              </a:extLst>
+            </p:cNvPr>
+            <p:cNvSpPr/>
+            <p:nvPr/>
+          </p:nvSpPr>
+          <p:spPr>
+            <a:xfrm>
+              <a:off x="297985" y="1951631"/>
+              <a:ext cx="3345968" cy="4148914"/>
+            </a:xfrm>
+            <a:prstGeom prst="roundRect">
+              <a:avLst>
+                <a:gd name="adj" fmla="val 3659"/>
+              </a:avLst>
+            </a:prstGeom>
+          </p:spPr>
+          <p:style>
+            <a:lnRef idx="2">
+              <a:schemeClr val="accent6"/>
+            </a:lnRef>
+            <a:fillRef idx="1">
+              <a:schemeClr val="lt1"/>
+            </a:fillRef>
+            <a:effectRef idx="0">
+              <a:schemeClr val="accent6"/>
+            </a:effectRef>
+            <a:fontRef idx="minor">
+              <a:schemeClr val="dk1"/>
+            </a:fontRef>
+          </p:style>
+          <p:txBody>
+            <a:bodyPr rtlCol="0" anchor="ctr"/>
+            <a:lstStyle/>
+            <a:p>
+              <a:pPr algn="ctr"/>
+              <a:endParaRPr lang="en-US" dirty="0"/>
+            </a:p>
+          </p:txBody>
+        </p:sp>
+        <p:sp>
+          <p:nvSpPr>
+            <p:cNvPr id="31" name="Diamond 30">
+              <a:extLst>
+                <a:ext uri="{FF2B5EF4-FFF2-40B4-BE49-F238E27FC236}">
+                  <a16:creationId xmlns:a16="http://schemas.microsoft.com/office/drawing/2014/main" id="{8F62B143-F265-4A2A-B870-8534A5A5A7B0}"/>
+                </a:ext>
+              </a:extLst>
+            </p:cNvPr>
+            <p:cNvSpPr/>
+            <p:nvPr/>
+          </p:nvSpPr>
+          <p:spPr>
+            <a:xfrm>
+              <a:off x="1575902" y="2186716"/>
+              <a:ext cx="865882" cy="876869"/>
+            </a:xfrm>
+            <a:prstGeom prst="diamond">
+              <a:avLst/>
+            </a:prstGeom>
+          </p:spPr>
+          <p:style>
+            <a:lnRef idx="2">
+              <a:schemeClr val="accent2">
+                <a:shade val="50000"/>
+              </a:schemeClr>
+            </a:lnRef>
+            <a:fillRef idx="1">
+              <a:schemeClr val="accent2"/>
+            </a:fillRef>
+            <a:effectRef idx="0">
+              <a:schemeClr val="accent2"/>
+            </a:effectRef>
+            <a:fontRef idx="minor">
+              <a:schemeClr val="lt1"/>
+            </a:fontRef>
+          </p:style>
+          <p:txBody>
+            <a:bodyPr rtlCol="0" anchor="ctr"/>
+            <a:lstStyle/>
+            <a:p>
+              <a:pPr algn="ctr"/>
+              <a:endParaRPr lang="en-US"/>
+            </a:p>
+          </p:txBody>
+        </p:sp>
+        <p:sp>
+          <p:nvSpPr>
+            <p:cNvPr id="32" name="TextBox 31">
+              <a:extLst>
+                <a:ext uri="{FF2B5EF4-FFF2-40B4-BE49-F238E27FC236}">
+                  <a16:creationId xmlns:a16="http://schemas.microsoft.com/office/drawing/2014/main" id="{54DB9C0A-DE13-4AA9-ABFA-A1CFACE255DA}"/>
+                </a:ext>
+              </a:extLst>
+            </p:cNvPr>
+            <p:cNvSpPr txBox="1"/>
+            <p:nvPr/>
+          </p:nvSpPr>
+          <p:spPr>
+            <a:xfrm>
+              <a:off x="707641" y="3196144"/>
+              <a:ext cx="2936312" cy="369332"/>
+            </a:xfrm>
+            <a:prstGeom prst="rect">
+              <a:avLst/>
+            </a:prstGeom>
+            <a:noFill/>
+          </p:spPr>
+          <p:txBody>
+            <a:bodyPr wrap="square" rtlCol="0">
+              <a:spAutoFit/>
+            </a:bodyPr>
+            <a:lstStyle/>
+            <a:p>
+              <a:r>
+                <a:rPr lang="en-US" b="1" dirty="0"/>
+                <a:t>SUPPORT FOR MANAGER</a:t>
+              </a:r>
+            </a:p>
+          </p:txBody>
+        </p:sp>
+        <p:sp>
+          <p:nvSpPr>
+            <p:cNvPr id="33" name="Rectangle: Rounded Corners 32">
+              <a:extLst>
+                <a:ext uri="{FF2B5EF4-FFF2-40B4-BE49-F238E27FC236}">
+                  <a16:creationId xmlns:a16="http://schemas.microsoft.com/office/drawing/2014/main" id="{E5131C3D-52C6-4A18-881C-CD94C898051F}"/>
+                </a:ext>
+              </a:extLst>
+            </p:cNvPr>
+            <p:cNvSpPr/>
+            <p:nvPr/>
+          </p:nvSpPr>
+          <p:spPr>
+            <a:xfrm>
+              <a:off x="1062554" y="5298085"/>
+              <a:ext cx="1810482" cy="418706"/>
+            </a:xfrm>
+            <a:prstGeom prst="roundRect">
+              <a:avLst/>
+            </a:prstGeom>
+            <a:noFill/>
+            <a:ln>
+              <a:solidFill>
+                <a:schemeClr val="accent2"/>
+              </a:solidFill>
+            </a:ln>
+          </p:spPr>
+          <p:style>
+            <a:lnRef idx="0">
+              <a:scrgbClr r="0" g="0" b="0"/>
+            </a:lnRef>
+            <a:fillRef idx="0">
+              <a:scrgbClr r="0" g="0" b="0"/>
+            </a:fillRef>
+            <a:effectRef idx="0">
+              <a:scrgbClr r="0" g="0" b="0"/>
+            </a:effectRef>
+            <a:fontRef idx="minor">
+              <a:schemeClr val="accent2"/>
+            </a:fontRef>
+          </p:style>
+          <p:txBody>
+            <a:bodyPr rtlCol="0" anchor="ctr"/>
+            <a:lstStyle/>
+            <a:p>
+              <a:pPr algn="ctr"/>
+              <a:r>
+                <a:rPr lang="en-US" sz="1600" dirty="0"/>
+                <a:t>READ MORE</a:t>
+              </a:r>
+            </a:p>
+          </p:txBody>
+        </p:sp>
+        <p:sp>
+          <p:nvSpPr>
+            <p:cNvPr id="34" name="Rectangle 33">
+              <a:extLst>
+                <a:ext uri="{FF2B5EF4-FFF2-40B4-BE49-F238E27FC236}">
+                  <a16:creationId xmlns:a16="http://schemas.microsoft.com/office/drawing/2014/main" id="{87BBF893-4953-49B2-8021-1FFDB4A8847C}"/>
+                </a:ext>
+              </a:extLst>
+            </p:cNvPr>
+            <p:cNvSpPr/>
+            <p:nvPr/>
+          </p:nvSpPr>
+          <p:spPr>
+            <a:xfrm>
+              <a:off x="499639" y="3829991"/>
+              <a:ext cx="2936312" cy="830997"/>
+            </a:xfrm>
+            <a:prstGeom prst="rect">
+              <a:avLst/>
+            </a:prstGeom>
+          </p:spPr>
+          <p:txBody>
+            <a:bodyPr wrap="square">
+              <a:spAutoFit/>
+            </a:bodyPr>
+            <a:lstStyle/>
+            <a:p>
+              <a:pPr algn="just"/>
+              <a:r>
+                <a:rPr lang="en-US" sz="1600" dirty="0">
+                  <a:solidFill>
+                    <a:srgbClr val="222222"/>
+                  </a:solidFill>
+                </a:rPr>
+                <a:t>Lorem Ipsum. </a:t>
+              </a:r>
+              <a:r>
+                <a:rPr lang="en-US" sz="1600" dirty="0" err="1">
+                  <a:solidFill>
+                    <a:srgbClr val="222222"/>
+                  </a:solidFill>
+                </a:rPr>
+                <a:t>Proin</a:t>
+              </a:r>
+              <a:r>
+                <a:rPr lang="en-US" sz="1600" dirty="0">
+                  <a:solidFill>
+                    <a:srgbClr val="222222"/>
+                  </a:solidFill>
+                </a:rPr>
+                <a:t> gravida </a:t>
+              </a:r>
+              <a:r>
+                <a:rPr lang="en-US" sz="1600" dirty="0" err="1">
+                  <a:solidFill>
+                    <a:srgbClr val="222222"/>
+                  </a:solidFill>
+                </a:rPr>
+                <a:t>nibh</a:t>
+              </a:r>
+              <a:r>
+                <a:rPr lang="en-US" sz="1600" dirty="0">
+                  <a:solidFill>
+                    <a:srgbClr val="222222"/>
+                  </a:solidFill>
+                </a:rPr>
+                <a:t> vel </a:t>
+              </a:r>
+              <a:r>
+                <a:rPr lang="en-US" sz="1600" dirty="0" err="1">
+                  <a:solidFill>
+                    <a:srgbClr val="222222"/>
+                  </a:solidFill>
+                </a:rPr>
+                <a:t>velit</a:t>
+              </a:r>
+              <a:r>
+                <a:rPr lang="en-US" sz="1600" dirty="0">
+                  <a:solidFill>
+                    <a:srgbClr val="222222"/>
+                  </a:solidFill>
+                </a:rPr>
+                <a:t> </a:t>
+              </a:r>
+              <a:r>
+                <a:rPr lang="en-US" sz="1600" dirty="0" err="1">
+                  <a:solidFill>
+                    <a:srgbClr val="222222"/>
+                  </a:solidFill>
+                </a:rPr>
+                <a:t>auctor</a:t>
+              </a:r>
+              <a:r>
+                <a:rPr lang="en-US" sz="1600" dirty="0">
+                  <a:solidFill>
+                    <a:srgbClr val="222222"/>
+                  </a:solidFill>
+                </a:rPr>
+                <a:t> </a:t>
+              </a:r>
+              <a:r>
+                <a:rPr lang="en-US" sz="1600" dirty="0" err="1">
+                  <a:solidFill>
+                    <a:srgbClr val="222222"/>
+                  </a:solidFill>
+                </a:rPr>
+                <a:t>aliquet</a:t>
+              </a:r>
+              <a:r>
+                <a:rPr lang="en-US" sz="1600" dirty="0">
+                  <a:solidFill>
+                    <a:srgbClr val="222222"/>
+                  </a:solidFill>
+                </a:rPr>
+                <a:t>. </a:t>
+              </a:r>
+              <a:r>
+                <a:rPr lang="en-US" sz="1600" dirty="0" err="1">
+                  <a:solidFill>
+                    <a:srgbClr val="222222"/>
+                  </a:solidFill>
+                </a:rPr>
+                <a:t>Aenean</a:t>
+              </a:r>
+              <a:r>
+                <a:rPr lang="en-US" sz="1600" dirty="0">
+                  <a:solidFill>
+                    <a:srgbClr val="222222"/>
+                  </a:solidFill>
+                </a:rPr>
+                <a:t> </a:t>
+              </a:r>
+              <a:r>
+                <a:rPr lang="en-US" sz="1600" dirty="0" err="1">
+                  <a:solidFill>
+                    <a:srgbClr val="222222"/>
+                  </a:solidFill>
+                </a:rPr>
+                <a:t>sollicitudin</a:t>
+              </a:r>
+              <a:r>
+                <a:rPr lang="en-US" sz="1600" dirty="0">
+                  <a:solidFill>
+                    <a:srgbClr val="222222"/>
+                  </a:solidFill>
+                </a:rPr>
+                <a:t>, lorem </a:t>
+              </a:r>
+              <a:r>
+                <a:rPr lang="en-US" sz="1600" dirty="0" err="1">
+                  <a:solidFill>
+                    <a:srgbClr val="222222"/>
+                  </a:solidFill>
+                </a:rPr>
+                <a:t>quis</a:t>
+              </a:r>
+              <a:r>
+                <a:rPr lang="en-US" sz="1600" dirty="0">
+                  <a:solidFill>
+                    <a:srgbClr val="222222"/>
+                  </a:solidFill>
+                </a:rPr>
+                <a:t> </a:t>
+              </a:r>
+              <a:r>
+                <a:rPr lang="en-US" sz="1600" dirty="0" err="1">
+                  <a:solidFill>
+                    <a:srgbClr val="222222"/>
+                  </a:solidFill>
+                </a:rPr>
+                <a:t>bibend</a:t>
+              </a:r>
+              <a:r>
+                <a:rPr lang="en-US" sz="1600" dirty="0">
+                  <a:solidFill>
+                    <a:srgbClr val="222222"/>
+                  </a:solidFill>
+                </a:rPr>
+                <a:t>.</a:t>
+              </a:r>
+              <a:endParaRPr lang="en-US" sz="1600" dirty="0"/>
+            </a:p>
+          </p:txBody>
+        </p:sp>
+      </p:grpSp>
+      <p:grpSp>
+        <p:nvGrpSpPr>
+          <p:cNvPr id="35" name="Group 34">
+            <a:extLst>
+              <a:ext uri="{FF2B5EF4-FFF2-40B4-BE49-F238E27FC236}">
+                <a16:creationId xmlns:a16="http://schemas.microsoft.com/office/drawing/2014/main" id="{230B71AE-5E7F-4751-B3B3-E0931F744FF9}"/>
+              </a:ext>
+            </a:extLst>
+          </p:cNvPr>
+          <p:cNvGrpSpPr/>
+          <p:nvPr/>
+        </p:nvGrpSpPr>
+        <p:grpSpPr>
+          <a:xfrm>
+            <a:off x="4466975" y="1907934"/>
+            <a:ext cx="3345968" cy="4148914"/>
+            <a:chOff x="297985" y="1951631"/>
+            <a:chExt cx="3345968" cy="4148914"/>
+          </a:xfrm>
+        </p:grpSpPr>
+        <p:sp>
+          <p:nvSpPr>
+            <p:cNvPr id="36" name="Rectangle: Rounded Corners 35">
+              <a:extLst>
+                <a:ext uri="{FF2B5EF4-FFF2-40B4-BE49-F238E27FC236}">
+                  <a16:creationId xmlns:a16="http://schemas.microsoft.com/office/drawing/2014/main" id="{81FB48C1-BDBC-4B0F-92BC-57680E9E2303}"/>
+                </a:ext>
+              </a:extLst>
+            </p:cNvPr>
+            <p:cNvSpPr/>
+            <p:nvPr/>
+          </p:nvSpPr>
+          <p:spPr>
+            <a:xfrm>
+              <a:off x="297985" y="1951631"/>
+              <a:ext cx="3345968" cy="4148914"/>
+            </a:xfrm>
+            <a:prstGeom prst="roundRect">
+              <a:avLst>
+                <a:gd name="adj" fmla="val 3659"/>
+              </a:avLst>
+            </a:prstGeom>
+          </p:spPr>
+          <p:style>
+            <a:lnRef idx="2">
+              <a:schemeClr val="accent6"/>
+            </a:lnRef>
+            <a:fillRef idx="1">
+              <a:schemeClr val="lt1"/>
+            </a:fillRef>
+            <a:effectRef idx="0">
+              <a:schemeClr val="accent6"/>
+            </a:effectRef>
+            <a:fontRef idx="minor">
+              <a:schemeClr val="dk1"/>
+            </a:fontRef>
+          </p:style>
+          <p:txBody>
+            <a:bodyPr rtlCol="0" anchor="ctr"/>
+            <a:lstStyle/>
+            <a:p>
+              <a:pPr algn="ctr"/>
+              <a:endParaRPr lang="en-US" dirty="0"/>
+            </a:p>
+          </p:txBody>
+        </p:sp>
+        <p:sp>
+          <p:nvSpPr>
+            <p:cNvPr id="37" name="Diamond 36">
+              <a:extLst>
+                <a:ext uri="{FF2B5EF4-FFF2-40B4-BE49-F238E27FC236}">
+                  <a16:creationId xmlns:a16="http://schemas.microsoft.com/office/drawing/2014/main" id="{C72B6BF3-D0B4-4EF7-B809-A3582130BEE6}"/>
+                </a:ext>
+              </a:extLst>
+            </p:cNvPr>
+            <p:cNvSpPr/>
+            <p:nvPr/>
+          </p:nvSpPr>
+          <p:spPr>
+            <a:xfrm>
+              <a:off x="1575902" y="2186716"/>
+              <a:ext cx="865882" cy="876869"/>
+            </a:xfrm>
+            <a:prstGeom prst="diamond">
+              <a:avLst/>
+            </a:prstGeom>
+          </p:spPr>
+          <p:style>
+            <a:lnRef idx="2">
+              <a:schemeClr val="accent2">
+                <a:shade val="50000"/>
+              </a:schemeClr>
+            </a:lnRef>
+            <a:fillRef idx="1">
+              <a:schemeClr val="accent2"/>
+            </a:fillRef>
+            <a:effectRef idx="0">
+              <a:schemeClr val="accent2"/>
+            </a:effectRef>
+            <a:fontRef idx="minor">
+              <a:schemeClr val="lt1"/>
+            </a:fontRef>
+          </p:style>
+          <p:txBody>
+            <a:bodyPr rtlCol="0" anchor="ctr"/>
+            <a:lstStyle/>
+            <a:p>
+              <a:pPr algn="ctr"/>
+              <a:endParaRPr lang="en-US"/>
+            </a:p>
+          </p:txBody>
+        </p:sp>
+        <p:sp>
+          <p:nvSpPr>
+            <p:cNvPr id="38" name="TextBox 37">
+              <a:extLst>
+                <a:ext uri="{FF2B5EF4-FFF2-40B4-BE49-F238E27FC236}">
+                  <a16:creationId xmlns:a16="http://schemas.microsoft.com/office/drawing/2014/main" id="{6E550316-3AC9-4BA9-ADA3-DAC25151BB5B}"/>
+                </a:ext>
+              </a:extLst>
+            </p:cNvPr>
+            <p:cNvSpPr txBox="1"/>
+            <p:nvPr/>
+          </p:nvSpPr>
+          <p:spPr>
+            <a:xfrm>
+              <a:off x="707641" y="3196144"/>
+              <a:ext cx="2936312" cy="369332"/>
+            </a:xfrm>
+            <a:prstGeom prst="rect">
+              <a:avLst/>
+            </a:prstGeom>
+            <a:noFill/>
+          </p:spPr>
+          <p:txBody>
+            <a:bodyPr wrap="square" rtlCol="0">
+              <a:spAutoFit/>
+            </a:bodyPr>
+            <a:lstStyle/>
+            <a:p>
+              <a:r>
+                <a:rPr lang="en-US" b="1" dirty="0"/>
+                <a:t>SUPPORT FOR TEACHER</a:t>
+              </a:r>
+            </a:p>
+          </p:txBody>
+        </p:sp>
+        <p:sp>
+          <p:nvSpPr>
+            <p:cNvPr id="39" name="Rectangle: Rounded Corners 38">
+              <a:extLst>
+                <a:ext uri="{FF2B5EF4-FFF2-40B4-BE49-F238E27FC236}">
+                  <a16:creationId xmlns:a16="http://schemas.microsoft.com/office/drawing/2014/main" id="{C2227BD3-FD0A-4FBC-B1E0-7AA38CDED370}"/>
+                </a:ext>
+              </a:extLst>
+            </p:cNvPr>
+            <p:cNvSpPr/>
+            <p:nvPr/>
+          </p:nvSpPr>
+          <p:spPr>
+            <a:xfrm>
+              <a:off x="1062554" y="5281036"/>
+              <a:ext cx="1810482" cy="435755"/>
+            </a:xfrm>
+            <a:prstGeom prst="roundRect">
+              <a:avLst/>
+            </a:prstGeom>
+            <a:noFill/>
+            <a:ln>
+              <a:solidFill>
+                <a:schemeClr val="accent2"/>
+              </a:solidFill>
+            </a:ln>
+          </p:spPr>
+          <p:style>
+            <a:lnRef idx="0">
+              <a:scrgbClr r="0" g="0" b="0"/>
+            </a:lnRef>
+            <a:fillRef idx="0">
+              <a:scrgbClr r="0" g="0" b="0"/>
+            </a:fillRef>
+            <a:effectRef idx="0">
+              <a:scrgbClr r="0" g="0" b="0"/>
+            </a:effectRef>
+            <a:fontRef idx="minor">
+              <a:schemeClr val="accent2"/>
+            </a:fontRef>
+          </p:style>
+          <p:txBody>
+            <a:bodyPr rtlCol="0" anchor="ctr"/>
+            <a:lstStyle/>
+            <a:p>
+              <a:pPr algn="ctr"/>
+              <a:r>
+                <a:rPr lang="en-US" sz="1600" dirty="0"/>
+                <a:t>READ MORE</a:t>
+              </a:r>
+            </a:p>
+          </p:txBody>
+        </p:sp>
+        <p:sp>
+          <p:nvSpPr>
+            <p:cNvPr id="40" name="Rectangle 39">
+              <a:extLst>
+                <a:ext uri="{FF2B5EF4-FFF2-40B4-BE49-F238E27FC236}">
+                  <a16:creationId xmlns:a16="http://schemas.microsoft.com/office/drawing/2014/main" id="{7B4282AE-343C-4655-A6BF-EBF15D7B35F0}"/>
+                </a:ext>
+              </a:extLst>
+            </p:cNvPr>
+            <p:cNvSpPr/>
+            <p:nvPr/>
+          </p:nvSpPr>
+          <p:spPr>
+            <a:xfrm>
+              <a:off x="499639" y="3829991"/>
+              <a:ext cx="2936312" cy="830997"/>
+            </a:xfrm>
+            <a:prstGeom prst="rect">
+              <a:avLst/>
+            </a:prstGeom>
+          </p:spPr>
+          <p:txBody>
+            <a:bodyPr wrap="square">
+              <a:spAutoFit/>
+            </a:bodyPr>
+            <a:lstStyle/>
+            <a:p>
+              <a:pPr algn="just"/>
+              <a:r>
+                <a:rPr lang="en-US" sz="1600" dirty="0">
+                  <a:solidFill>
+                    <a:srgbClr val="222222"/>
+                  </a:solidFill>
+                </a:rPr>
+                <a:t>Lorem Ipsum. </a:t>
+              </a:r>
+              <a:r>
+                <a:rPr lang="en-US" sz="1600" dirty="0" err="1">
+                  <a:solidFill>
+                    <a:srgbClr val="222222"/>
+                  </a:solidFill>
+                </a:rPr>
+                <a:t>Proin</a:t>
+              </a:r>
+              <a:r>
+                <a:rPr lang="en-US" sz="1600" dirty="0">
+                  <a:solidFill>
+                    <a:srgbClr val="222222"/>
+                  </a:solidFill>
+                </a:rPr>
+                <a:t> gravida </a:t>
+              </a:r>
+              <a:r>
+                <a:rPr lang="en-US" sz="1600" dirty="0" err="1">
+                  <a:solidFill>
+                    <a:srgbClr val="222222"/>
+                  </a:solidFill>
+                </a:rPr>
+                <a:t>nibh</a:t>
+              </a:r>
+              <a:r>
+                <a:rPr lang="en-US" sz="1600" dirty="0">
+                  <a:solidFill>
+                    <a:srgbClr val="222222"/>
+                  </a:solidFill>
+                </a:rPr>
+                <a:t> vel </a:t>
+              </a:r>
+              <a:r>
+                <a:rPr lang="en-US" sz="1600" dirty="0" err="1">
+                  <a:solidFill>
+                    <a:srgbClr val="222222"/>
+                  </a:solidFill>
+                </a:rPr>
+                <a:t>velit</a:t>
+              </a:r>
+              <a:r>
+                <a:rPr lang="en-US" sz="1600" dirty="0">
+                  <a:solidFill>
+                    <a:srgbClr val="222222"/>
+                  </a:solidFill>
+                </a:rPr>
+                <a:t> </a:t>
+              </a:r>
+              <a:r>
+                <a:rPr lang="en-US" sz="1600" dirty="0" err="1">
+                  <a:solidFill>
+                    <a:srgbClr val="222222"/>
+                  </a:solidFill>
+                </a:rPr>
+                <a:t>auctor</a:t>
+              </a:r>
+              <a:r>
+                <a:rPr lang="en-US" sz="1600" dirty="0">
+                  <a:solidFill>
+                    <a:srgbClr val="222222"/>
+                  </a:solidFill>
+                </a:rPr>
+                <a:t> </a:t>
+              </a:r>
+              <a:r>
+                <a:rPr lang="en-US" sz="1600" dirty="0" err="1">
+                  <a:solidFill>
+                    <a:srgbClr val="222222"/>
+                  </a:solidFill>
+                </a:rPr>
+                <a:t>aliquet</a:t>
+              </a:r>
+              <a:r>
+                <a:rPr lang="en-US" sz="1600" dirty="0">
+                  <a:solidFill>
+                    <a:srgbClr val="222222"/>
+                  </a:solidFill>
+                </a:rPr>
+                <a:t>. </a:t>
+              </a:r>
+              <a:r>
+                <a:rPr lang="en-US" sz="1600" dirty="0" err="1">
+                  <a:solidFill>
+                    <a:srgbClr val="222222"/>
+                  </a:solidFill>
+                </a:rPr>
+                <a:t>Aenean</a:t>
+              </a:r>
+              <a:r>
+                <a:rPr lang="en-US" sz="1600" dirty="0">
+                  <a:solidFill>
+                    <a:srgbClr val="222222"/>
+                  </a:solidFill>
+                </a:rPr>
+                <a:t> </a:t>
+              </a:r>
+              <a:r>
+                <a:rPr lang="en-US" sz="1600" dirty="0" err="1">
+                  <a:solidFill>
+                    <a:srgbClr val="222222"/>
+                  </a:solidFill>
+                </a:rPr>
+                <a:t>sollicitudin</a:t>
+              </a:r>
+              <a:r>
+                <a:rPr lang="en-US" sz="1600" dirty="0">
+                  <a:solidFill>
+                    <a:srgbClr val="222222"/>
+                  </a:solidFill>
+                </a:rPr>
+                <a:t>, lorem </a:t>
+              </a:r>
+              <a:r>
+                <a:rPr lang="en-US" sz="1600" dirty="0" err="1">
+                  <a:solidFill>
+                    <a:srgbClr val="222222"/>
+                  </a:solidFill>
+                </a:rPr>
+                <a:t>quis</a:t>
+              </a:r>
+              <a:r>
+                <a:rPr lang="en-US" sz="1600" dirty="0">
+                  <a:solidFill>
+                    <a:srgbClr val="222222"/>
+                  </a:solidFill>
+                </a:rPr>
+                <a:t> </a:t>
+              </a:r>
+              <a:r>
+                <a:rPr lang="en-US" sz="1600" dirty="0" err="1">
+                  <a:solidFill>
+                    <a:srgbClr val="222222"/>
+                  </a:solidFill>
+                </a:rPr>
+                <a:t>bibend</a:t>
+              </a:r>
+              <a:r>
+                <a:rPr lang="en-US" sz="1600" dirty="0">
+                  <a:solidFill>
+                    <a:srgbClr val="222222"/>
+                  </a:solidFill>
+                </a:rPr>
+                <a:t>.</a:t>
+              </a:r>
+              <a:endParaRPr lang="en-US" sz="1600" dirty="0"/>
+            </a:p>
+          </p:txBody>
+        </p:sp>
+      </p:grpSp>
+    </p:spTree>
+    <p:extLst>
+      <p:ext uri="{BB962C8B-B14F-4D97-AF65-F5344CB8AC3E}">
+        <p14:creationId xmlns:p14="http://schemas.microsoft.com/office/powerpoint/2010/main" val="1140464505"/>
+      </p:ext>
+    </p:extLst>
+  </p:cSld>
+  <p:clrMapOvr>
+    <a:masterClrMapping/>
+  </p:clrMapOvr>
+</p:sld>
+</file>
+
+<file path=ppt/slides/slide5.xml><?xml version="1.0" encoding="utf-8"?>
+<p:sld xmlns:a="http://schemas.openxmlformats.org/drawingml/2006/main" xmlns:r="http://schemas.openxmlformats.org/officeDocument/2006/relationships" xmlns:p="http://schemas.openxmlformats.org/presentationml/2006/main">
+  <p:cSld>
+    <p:spTree>
+      <p:nvGrpSpPr>
+        <p:cNvPr id="1" name=""/>
+        <p:cNvGrpSpPr/>
+        <p:nvPr/>
+      </p:nvGrpSpPr>
+      <p:grpSpPr>
+        <a:xfrm>
+          <a:off x="0" y="0"/>
+          <a:ext cx="0" cy="0"/>
+          <a:chOff x="0" y="0"/>
+          <a:chExt cx="0" cy="0"/>
+        </a:xfrm>
+      </p:grpSpPr>
+      <p:sp>
+        <p:nvSpPr>
+          <p:cNvPr id="7" name="TextBox 6">
+            <a:extLst>
+              <a:ext uri="{FF2B5EF4-FFF2-40B4-BE49-F238E27FC236}">
+                <a16:creationId xmlns:a16="http://schemas.microsoft.com/office/drawing/2014/main" id="{89C73D31-4D1C-4E67-808F-DF9ECA4F8AE5}"/>
+              </a:ext>
+            </a:extLst>
+          </p:cNvPr>
+          <p:cNvSpPr txBox="1"/>
+          <p:nvPr/>
+        </p:nvSpPr>
+        <p:spPr>
+          <a:xfrm>
+            <a:off x="4080457" y="536379"/>
+            <a:ext cx="4226419" cy="646331"/>
+          </a:xfrm>
+          <a:prstGeom prst="rect">
+            <a:avLst/>
+          </a:prstGeom>
+          <a:noFill/>
+        </p:spPr>
+        <p:txBody>
+          <a:bodyPr wrap="square" rtlCol="0">
+            <a:spAutoFit/>
+          </a:bodyPr>
+          <a:lstStyle/>
+          <a:p>
+            <a:pPr algn="ctr"/>
+            <a:r>
+              <a:rPr lang="en-US" sz="3600" dirty="0"/>
+              <a:t>MEET THE TEAM</a:t>
+            </a:r>
+          </a:p>
+        </p:txBody>
+      </p:sp>
+      <p:cxnSp>
+        <p:nvCxnSpPr>
+          <p:cNvPr id="8" name="Straight Connector 7">
+            <a:extLst>
+              <a:ext uri="{FF2B5EF4-FFF2-40B4-BE49-F238E27FC236}">
+                <a16:creationId xmlns:a16="http://schemas.microsoft.com/office/drawing/2014/main" id="{5A24FE07-7EB9-4212-AFC8-0C2396CB9F53}"/>
+              </a:ext>
+            </a:extLst>
+          </p:cNvPr>
+          <p:cNvCxnSpPr>
+            <a:cxnSpLocks/>
+          </p:cNvCxnSpPr>
+          <p:nvPr/>
+        </p:nvCxnSpPr>
+        <p:spPr>
+          <a:xfrm>
+            <a:off x="4893972" y="1287885"/>
+            <a:ext cx="865517" cy="0"/>
+          </a:xfrm>
+          <a:prstGeom prst="line">
+            <a:avLst/>
+          </a:prstGeom>
+          <a:ln w="38100"/>
+        </p:spPr>
+        <p:style>
+          <a:lnRef idx="1">
+            <a:schemeClr val="accent1"/>
+          </a:lnRef>
+          <a:fillRef idx="0">
+            <a:schemeClr val="accent1"/>
+          </a:fillRef>
+          <a:effectRef idx="0">
+            <a:schemeClr val="accent1"/>
+          </a:effectRef>
+          <a:fontRef idx="minor">
+            <a:schemeClr val="tx1"/>
+          </a:fontRef>
+        </p:style>
+      </p:cxnSp>
+      <p:cxnSp>
+        <p:nvCxnSpPr>
+          <p:cNvPr id="9" name="Straight Connector 8">
+            <a:extLst>
+              <a:ext uri="{FF2B5EF4-FFF2-40B4-BE49-F238E27FC236}">
+                <a16:creationId xmlns:a16="http://schemas.microsoft.com/office/drawing/2014/main" id="{93A2FCC8-FCF1-4F4F-A887-CBFBC547C6FA}"/>
+              </a:ext>
+            </a:extLst>
+          </p:cNvPr>
+          <p:cNvCxnSpPr>
+            <a:cxnSpLocks/>
+          </p:cNvCxnSpPr>
+          <p:nvPr/>
+        </p:nvCxnSpPr>
+        <p:spPr>
+          <a:xfrm>
+            <a:off x="6501685" y="1287885"/>
+            <a:ext cx="865517" cy="0"/>
+          </a:xfrm>
+          <a:prstGeom prst="line">
+            <a:avLst/>
+          </a:prstGeom>
+          <a:ln w="38100"/>
+        </p:spPr>
+        <p:style>
+          <a:lnRef idx="1">
+            <a:schemeClr val="accent1"/>
+          </a:lnRef>
+          <a:fillRef idx="0">
+            <a:schemeClr val="accent1"/>
+          </a:fillRef>
+          <a:effectRef idx="0">
+            <a:schemeClr val="accent1"/>
+          </a:effectRef>
+          <a:fontRef idx="minor">
+            <a:schemeClr val="tx1"/>
+          </a:fontRef>
+        </p:style>
+      </p:cxnSp>
+      <p:pic>
+        <p:nvPicPr>
+          <p:cNvPr id="10" name="Picture 9" descr="Kết quả hình ảnh cho book icon">
+            <a:extLst>
+              <a:ext uri="{FF2B5EF4-FFF2-40B4-BE49-F238E27FC236}">
+                <a16:creationId xmlns:a16="http://schemas.microsoft.com/office/drawing/2014/main" id="{92E77D23-4D15-4AE4-A4FC-FE4B0D7A5AEC}"/>
+              </a:ext>
+            </a:extLst>
+          </p:cNvPr>
+          <p:cNvPicPr>
+            <a:picLocks noChangeAspect="1" noChangeArrowheads="1"/>
+          </p:cNvPicPr>
+          <p:nvPr/>
+        </p:nvPicPr>
+        <p:blipFill>
+          <a:blip r:embed="rId2">
+            <a:extLst>
+              <a:ext uri="{28A0092B-C50C-407E-A947-70E740481C1C}">
+                <a14:useLocalDpi xmlns:a14="http://schemas.microsoft.com/office/drawing/2010/main" val="0"/>
+              </a:ext>
+            </a:extLst>
+          </a:blip>
+          <a:srcRect/>
+          <a:stretch>
+            <a:fillRect/>
+          </a:stretch>
+        </p:blipFill>
+        <p:spPr bwMode="auto">
+          <a:xfrm>
+            <a:off x="5979018" y="1105434"/>
+            <a:ext cx="318480" cy="364901"/>
+          </a:xfrm>
+          <a:prstGeom prst="rect">
+            <a:avLst/>
+          </a:prstGeom>
+          <a:noFill/>
+          <a:extLst>
+            <a:ext uri="{909E8E84-426E-40DD-AFC4-6F175D3DCCD1}">
+              <a14:hiddenFill xmlns:a14="http://schemas.microsoft.com/office/drawing/2010/main">
+                <a:solidFill>
+                  <a:srgbClr val="FFFFFF"/>
+                </a:solidFill>
+              </a14:hiddenFill>
+            </a:ext>
+          </a:extLst>
+        </p:spPr>
+      </p:pic>
+      <p:sp>
+        <p:nvSpPr>
+          <p:cNvPr id="11" name="Rectangle 10">
+            <a:extLst>
+              <a:ext uri="{FF2B5EF4-FFF2-40B4-BE49-F238E27FC236}">
+                <a16:creationId xmlns:a16="http://schemas.microsoft.com/office/drawing/2014/main" id="{7EE26072-E029-47B6-89CD-762C752CA50D}"/>
+              </a:ext>
+            </a:extLst>
+          </p:cNvPr>
+          <p:cNvSpPr/>
+          <p:nvPr/>
+        </p:nvSpPr>
+        <p:spPr>
+          <a:xfrm>
+            <a:off x="1032457" y="1575510"/>
+            <a:ext cx="10363424" cy="646331"/>
+          </a:xfrm>
+          <a:prstGeom prst="rect">
+            <a:avLst/>
+          </a:prstGeom>
+        </p:spPr>
+        <p:txBody>
+          <a:bodyPr wrap="square">
+            <a:spAutoFit/>
+          </a:bodyPr>
+          <a:lstStyle/>
+          <a:p>
+            <a:pPr algn="just"/>
+            <a:r>
+              <a:rPr lang="en-US" dirty="0"/>
+              <a:t>At </a:t>
+            </a:r>
+            <a:r>
+              <a:rPr lang="en-US" dirty="0" err="1"/>
+              <a:t>vero</a:t>
+            </a:r>
+            <a:r>
+              <a:rPr lang="en-US" dirty="0"/>
+              <a:t> </a:t>
+            </a:r>
+            <a:r>
+              <a:rPr lang="en-US" dirty="0" err="1"/>
+              <a:t>eos</a:t>
+            </a:r>
+            <a:r>
+              <a:rPr lang="en-US" dirty="0"/>
+              <a:t> et </a:t>
+            </a:r>
+            <a:r>
+              <a:rPr lang="en-US" dirty="0" err="1"/>
+              <a:t>accusam</a:t>
+            </a:r>
+            <a:r>
+              <a:rPr lang="en-US" dirty="0"/>
+              <a:t> et </a:t>
+            </a:r>
+            <a:r>
+              <a:rPr lang="en-US" dirty="0" err="1"/>
+              <a:t>justo</a:t>
+            </a:r>
+            <a:r>
+              <a:rPr lang="en-US" dirty="0"/>
+              <a:t> duo </a:t>
+            </a:r>
+            <a:r>
+              <a:rPr lang="en-US" dirty="0" err="1"/>
+              <a:t>dolores</a:t>
+            </a:r>
+            <a:r>
+              <a:rPr lang="en-US" dirty="0"/>
+              <a:t> et </a:t>
+            </a:r>
+            <a:r>
+              <a:rPr lang="en-US" dirty="0" err="1"/>
+              <a:t>ea</a:t>
+            </a:r>
+            <a:r>
+              <a:rPr lang="en-US" dirty="0"/>
+              <a:t> </a:t>
+            </a:r>
+            <a:r>
+              <a:rPr lang="en-US" dirty="0" err="1"/>
+              <a:t>rebum</a:t>
+            </a:r>
+            <a:r>
+              <a:rPr lang="en-US" dirty="0"/>
+              <a:t>. Stet </a:t>
+            </a:r>
+            <a:r>
+              <a:rPr lang="en-US" dirty="0" err="1"/>
+              <a:t>clita</a:t>
+            </a:r>
+            <a:r>
+              <a:rPr lang="en-US" dirty="0"/>
+              <a:t> </a:t>
+            </a:r>
+            <a:r>
+              <a:rPr lang="en-US" dirty="0" err="1"/>
+              <a:t>kasd</a:t>
+            </a:r>
+            <a:r>
+              <a:rPr lang="en-US" dirty="0"/>
+              <a:t> </a:t>
+            </a:r>
+            <a:r>
+              <a:rPr lang="en-US" dirty="0" err="1"/>
+              <a:t>gubergren</a:t>
+            </a:r>
+            <a:r>
+              <a:rPr lang="en-US" dirty="0"/>
+              <a:t>, no sea </a:t>
+            </a:r>
+            <a:r>
+              <a:rPr lang="en-US" dirty="0" err="1"/>
+              <a:t>takimata</a:t>
+            </a:r>
+            <a:r>
+              <a:rPr lang="en-US" dirty="0"/>
+              <a:t> </a:t>
+            </a:r>
+            <a:r>
+              <a:rPr lang="en-US" dirty="0" err="1"/>
+              <a:t>sanctus</a:t>
+            </a:r>
+            <a:r>
+              <a:rPr lang="en-US" dirty="0"/>
+              <a:t> </a:t>
+            </a:r>
+            <a:r>
+              <a:rPr lang="en-US" dirty="0" err="1"/>
+              <a:t>est</a:t>
+            </a:r>
+            <a:r>
+              <a:rPr lang="en-US" dirty="0"/>
+              <a:t> Lorem ipsum dolor sit </a:t>
+            </a:r>
+            <a:r>
+              <a:rPr lang="en-US" dirty="0" err="1"/>
+              <a:t>amet</a:t>
+            </a:r>
+            <a:r>
+              <a:rPr lang="en-US" dirty="0"/>
+              <a:t>. Lorem ipsum dolor sit </a:t>
+            </a:r>
+            <a:r>
+              <a:rPr lang="en-US" dirty="0" err="1"/>
+              <a:t>amet</a:t>
+            </a:r>
+            <a:r>
+              <a:rPr lang="en-US" dirty="0"/>
+              <a:t>, </a:t>
+            </a:r>
+            <a:r>
+              <a:rPr lang="en-US" dirty="0" err="1"/>
+              <a:t>consetetur</a:t>
+            </a:r>
+            <a:r>
+              <a:rPr lang="en-US" dirty="0"/>
+              <a:t> </a:t>
+            </a:r>
+            <a:r>
+              <a:rPr lang="en-US" dirty="0" err="1"/>
+              <a:t>sadipscing</a:t>
+            </a:r>
+            <a:r>
+              <a:rPr lang="en-US" dirty="0"/>
+              <a:t> </a:t>
+            </a:r>
+            <a:r>
+              <a:rPr lang="en-US" dirty="0" err="1"/>
+              <a:t>elitr</a:t>
+            </a:r>
+            <a:r>
+              <a:rPr lang="en-US" dirty="0"/>
+              <a:t>, sed diam </a:t>
+            </a:r>
+            <a:r>
+              <a:rPr lang="en-US" dirty="0" err="1"/>
+              <a:t>nonumy</a:t>
+            </a:r>
+            <a:endParaRPr lang="en-US" dirty="0"/>
+          </a:p>
+        </p:txBody>
+      </p:sp>
+      <p:grpSp>
+        <p:nvGrpSpPr>
+          <p:cNvPr id="22" name="Group 21">
+            <a:extLst>
+              <a:ext uri="{FF2B5EF4-FFF2-40B4-BE49-F238E27FC236}">
+                <a16:creationId xmlns:a16="http://schemas.microsoft.com/office/drawing/2014/main" id="{3FA17D10-4D55-434D-BF90-81ED69497860}"/>
+              </a:ext>
+            </a:extLst>
+          </p:cNvPr>
+          <p:cNvGrpSpPr/>
+          <p:nvPr/>
+        </p:nvGrpSpPr>
+        <p:grpSpPr>
+          <a:xfrm>
+            <a:off x="1111755" y="2291097"/>
+            <a:ext cx="2995999" cy="4259827"/>
+            <a:chOff x="1111755" y="2291097"/>
+            <a:chExt cx="2995999" cy="4259827"/>
+          </a:xfrm>
+        </p:grpSpPr>
+        <p:sp>
+          <p:nvSpPr>
+            <p:cNvPr id="12" name="Rectangle 11">
+              <a:extLst>
+                <a:ext uri="{FF2B5EF4-FFF2-40B4-BE49-F238E27FC236}">
+                  <a16:creationId xmlns:a16="http://schemas.microsoft.com/office/drawing/2014/main" id="{17EB9A6D-306B-4D14-AC8E-B0FAD0613185}"/>
+                </a:ext>
+              </a:extLst>
+            </p:cNvPr>
+            <p:cNvSpPr/>
+            <p:nvPr/>
+          </p:nvSpPr>
+          <p:spPr>
+            <a:xfrm>
+              <a:off x="1111755" y="2291097"/>
+              <a:ext cx="2995998" cy="3072469"/>
+            </a:xfrm>
+            <a:prstGeom prst="rect">
+              <a:avLst/>
+            </a:prstGeom>
+          </p:spPr>
+          <p:style>
+            <a:lnRef idx="2">
+              <a:schemeClr val="accent6"/>
+            </a:lnRef>
+            <a:fillRef idx="1">
+              <a:schemeClr val="lt1"/>
+            </a:fillRef>
+            <a:effectRef idx="0">
+              <a:schemeClr val="accent6"/>
+            </a:effectRef>
+            <a:fontRef idx="minor">
+              <a:schemeClr val="dk1"/>
+            </a:fontRef>
+          </p:style>
+          <p:txBody>
+            <a:bodyPr rtlCol="0" anchor="ctr"/>
+            <a:lstStyle/>
+            <a:p>
+              <a:pPr algn="ctr"/>
+              <a:r>
+                <a:rPr lang="en-US" dirty="0"/>
+                <a:t>IMAGE</a:t>
+              </a:r>
+            </a:p>
+          </p:txBody>
+        </p:sp>
+        <p:grpSp>
+          <p:nvGrpSpPr>
+            <p:cNvPr id="21" name="Group 20">
+              <a:extLst>
+                <a:ext uri="{FF2B5EF4-FFF2-40B4-BE49-F238E27FC236}">
+                  <a16:creationId xmlns:a16="http://schemas.microsoft.com/office/drawing/2014/main" id="{36C5C028-056F-453D-BAB8-4997CA55DA27}"/>
+                </a:ext>
+              </a:extLst>
+            </p:cNvPr>
+            <p:cNvGrpSpPr/>
+            <p:nvPr/>
+          </p:nvGrpSpPr>
+          <p:grpSpPr>
+            <a:xfrm>
+              <a:off x="1111756" y="5377214"/>
+              <a:ext cx="2995998" cy="1173710"/>
+              <a:chOff x="1098108" y="5445454"/>
+              <a:chExt cx="2995998" cy="1173710"/>
+            </a:xfrm>
+          </p:grpSpPr>
+          <p:sp>
+            <p:nvSpPr>
+              <p:cNvPr id="13" name="Rectangle 12">
+                <a:extLst>
+                  <a:ext uri="{FF2B5EF4-FFF2-40B4-BE49-F238E27FC236}">
+                    <a16:creationId xmlns:a16="http://schemas.microsoft.com/office/drawing/2014/main" id="{498AE4A6-E59B-4AE6-BC00-18DA9AA683C0}"/>
+                  </a:ext>
+                </a:extLst>
+              </p:cNvPr>
+              <p:cNvSpPr/>
+              <p:nvPr/>
+            </p:nvSpPr>
+            <p:spPr>
+              <a:xfrm>
+                <a:off x="1098108" y="5445454"/>
+                <a:ext cx="2995998" cy="1173710"/>
+              </a:xfrm>
+              <a:prstGeom prst="rect">
+                <a:avLst/>
+              </a:prstGeom>
+              <a:solidFill>
+                <a:schemeClr val="bg1">
+                  <a:lumMod val="95000"/>
+                </a:schemeClr>
+              </a:solidFill>
+              <a:ln>
+                <a:solidFill>
+                  <a:schemeClr val="tx1">
+                    <a:lumMod val="50000"/>
+                    <a:lumOff val="50000"/>
+                  </a:schemeClr>
+                </a:solidFill>
+              </a:ln>
+            </p:spPr>
+            <p:style>
+              <a:lnRef idx="0">
+                <a:scrgbClr r="0" g="0" b="0"/>
+              </a:lnRef>
+              <a:fillRef idx="0">
+                <a:scrgbClr r="0" g="0" b="0"/>
+              </a:fillRef>
+              <a:effectRef idx="0">
+                <a:scrgbClr r="0" g="0" b="0"/>
+              </a:effectRef>
+              <a:fontRef idx="minor">
+                <a:schemeClr val="lt1"/>
+              </a:fontRef>
+            </p:style>
+            <p:txBody>
+              <a:bodyPr rtlCol="0" anchor="ctr"/>
+              <a:lstStyle/>
+              <a:p>
+                <a:pPr algn="ctr"/>
+                <a:endParaRPr lang="en-US" dirty="0"/>
+              </a:p>
+            </p:txBody>
+          </p:sp>
+          <p:sp>
+            <p:nvSpPr>
+              <p:cNvPr id="14" name="TextBox 13">
+                <a:extLst>
+                  <a:ext uri="{FF2B5EF4-FFF2-40B4-BE49-F238E27FC236}">
+                    <a16:creationId xmlns:a16="http://schemas.microsoft.com/office/drawing/2014/main" id="{605B1E0A-5BC9-4535-A7A4-A729B1786CAB}"/>
+                  </a:ext>
+                </a:extLst>
+              </p:cNvPr>
+              <p:cNvSpPr txBox="1"/>
+              <p:nvPr/>
+            </p:nvSpPr>
+            <p:spPr>
+              <a:xfrm>
+                <a:off x="1111755" y="5489036"/>
+                <a:ext cx="1080762" cy="338554"/>
+              </a:xfrm>
+              <a:prstGeom prst="rect">
+                <a:avLst/>
+              </a:prstGeom>
+              <a:noFill/>
+            </p:spPr>
+            <p:txBody>
+              <a:bodyPr wrap="square" rtlCol="0">
+                <a:spAutoFit/>
+              </a:bodyPr>
+              <a:lstStyle/>
+              <a:p>
+                <a:r>
+                  <a:rPr lang="en-US" sz="1600" dirty="0"/>
+                  <a:t>Name</a:t>
+                </a:r>
+              </a:p>
+            </p:txBody>
+          </p:sp>
+          <p:sp>
+            <p:nvSpPr>
+              <p:cNvPr id="16" name="Rectangle 15">
+                <a:extLst>
+                  <a:ext uri="{FF2B5EF4-FFF2-40B4-BE49-F238E27FC236}">
+                    <a16:creationId xmlns:a16="http://schemas.microsoft.com/office/drawing/2014/main" id="{AECCBD2B-88CB-4FB3-AECF-87D540B28A7A}"/>
+                  </a:ext>
+                </a:extLst>
+              </p:cNvPr>
+              <p:cNvSpPr/>
+              <p:nvPr/>
+            </p:nvSpPr>
+            <p:spPr>
+              <a:xfrm>
+                <a:off x="1132610" y="5724812"/>
+                <a:ext cx="974947" cy="338554"/>
+              </a:xfrm>
+              <a:prstGeom prst="rect">
+                <a:avLst/>
+              </a:prstGeom>
+            </p:spPr>
+            <p:txBody>
+              <a:bodyPr wrap="none">
+                <a:spAutoFit/>
+              </a:bodyPr>
+              <a:lstStyle/>
+              <a:p>
+                <a:r>
+                  <a:rPr lang="en-US" sz="1600" dirty="0" err="1">
+                    <a:solidFill>
+                      <a:srgbClr val="222222"/>
+                    </a:solidFill>
+                  </a:rPr>
+                  <a:t>Speciality</a:t>
+                </a:r>
+                <a:endParaRPr lang="en-US" sz="1600" dirty="0"/>
+              </a:p>
+            </p:txBody>
+          </p:sp>
+          <p:sp>
+            <p:nvSpPr>
+              <p:cNvPr id="17" name="Rectangle 16">
+                <a:extLst>
+                  <a:ext uri="{FF2B5EF4-FFF2-40B4-BE49-F238E27FC236}">
+                    <a16:creationId xmlns:a16="http://schemas.microsoft.com/office/drawing/2014/main" id="{73D7DFB2-2576-42B4-8EA5-03B21168A3AD}"/>
+                  </a:ext>
+                </a:extLst>
+              </p:cNvPr>
+              <p:cNvSpPr/>
+              <p:nvPr/>
+            </p:nvSpPr>
+            <p:spPr>
+              <a:xfrm>
+                <a:off x="1269240" y="6119081"/>
+                <a:ext cx="428882" cy="420442"/>
+              </a:xfrm>
+              <a:prstGeom prst="rect">
+                <a:avLst/>
+              </a:prstGeom>
+            </p:spPr>
+            <p:style>
+              <a:lnRef idx="2">
+                <a:schemeClr val="accent1">
+                  <a:shade val="50000"/>
+                </a:schemeClr>
+              </a:lnRef>
+              <a:fillRef idx="1">
+                <a:schemeClr val="accent1"/>
+              </a:fillRef>
+              <a:effectRef idx="0">
+                <a:schemeClr val="accent1"/>
+              </a:effectRef>
+              <a:fontRef idx="minor">
+                <a:schemeClr val="lt1"/>
+              </a:fontRef>
+            </p:style>
+            <p:txBody>
+              <a:bodyPr rtlCol="0" anchor="ctr"/>
+              <a:lstStyle/>
+              <a:p>
+                <a:pPr algn="ctr"/>
+                <a:endParaRPr lang="en-US"/>
+              </a:p>
+            </p:txBody>
+          </p:sp>
+          <p:sp>
+            <p:nvSpPr>
+              <p:cNvPr id="18" name="Rectangle 17">
+                <a:extLst>
+                  <a:ext uri="{FF2B5EF4-FFF2-40B4-BE49-F238E27FC236}">
+                    <a16:creationId xmlns:a16="http://schemas.microsoft.com/office/drawing/2014/main" id="{697B6D27-0669-4CED-97F6-69769F846FB6}"/>
+                  </a:ext>
+                </a:extLst>
+              </p:cNvPr>
+              <p:cNvSpPr/>
+              <p:nvPr/>
+            </p:nvSpPr>
+            <p:spPr>
+              <a:xfrm>
+                <a:off x="1841958" y="6120037"/>
+                <a:ext cx="428882" cy="420442"/>
+              </a:xfrm>
+              <a:prstGeom prst="rect">
+                <a:avLst/>
+              </a:prstGeom>
+            </p:spPr>
+            <p:style>
+              <a:lnRef idx="2">
+                <a:schemeClr val="accent1">
+                  <a:shade val="50000"/>
+                </a:schemeClr>
+              </a:lnRef>
+              <a:fillRef idx="1">
+                <a:schemeClr val="accent1"/>
+              </a:fillRef>
+              <a:effectRef idx="0">
+                <a:schemeClr val="accent1"/>
+              </a:effectRef>
+              <a:fontRef idx="minor">
+                <a:schemeClr val="lt1"/>
+              </a:fontRef>
+            </p:style>
+            <p:txBody>
+              <a:bodyPr rtlCol="0" anchor="ctr"/>
+              <a:lstStyle/>
+              <a:p>
+                <a:pPr algn="ctr"/>
+                <a:endParaRPr lang="en-US"/>
+              </a:p>
+            </p:txBody>
+          </p:sp>
+          <p:sp>
+            <p:nvSpPr>
+              <p:cNvPr id="19" name="Rectangle 18">
+                <a:extLst>
+                  <a:ext uri="{FF2B5EF4-FFF2-40B4-BE49-F238E27FC236}">
+                    <a16:creationId xmlns:a16="http://schemas.microsoft.com/office/drawing/2014/main" id="{7EB8F33C-E7F6-4B36-B65F-AC20F97653C3}"/>
+                  </a:ext>
+                </a:extLst>
+              </p:cNvPr>
+              <p:cNvSpPr/>
+              <p:nvPr/>
+            </p:nvSpPr>
+            <p:spPr>
+              <a:xfrm>
+                <a:off x="2414676" y="6120037"/>
+                <a:ext cx="428882" cy="420442"/>
+              </a:xfrm>
+              <a:prstGeom prst="rect">
+                <a:avLst/>
+              </a:prstGeom>
+            </p:spPr>
+            <p:style>
+              <a:lnRef idx="2">
+                <a:schemeClr val="accent1">
+                  <a:shade val="50000"/>
+                </a:schemeClr>
+              </a:lnRef>
+              <a:fillRef idx="1">
+                <a:schemeClr val="accent1"/>
+              </a:fillRef>
+              <a:effectRef idx="0">
+                <a:schemeClr val="accent1"/>
+              </a:effectRef>
+              <a:fontRef idx="minor">
+                <a:schemeClr val="lt1"/>
+              </a:fontRef>
+            </p:style>
+            <p:txBody>
+              <a:bodyPr rtlCol="0" anchor="ctr"/>
+              <a:lstStyle/>
+              <a:p>
+                <a:pPr algn="ctr"/>
+                <a:endParaRPr lang="en-US"/>
+              </a:p>
+            </p:txBody>
+          </p:sp>
+          <p:sp>
+            <p:nvSpPr>
+              <p:cNvPr id="20" name="Rectangle 19">
+                <a:extLst>
+                  <a:ext uri="{FF2B5EF4-FFF2-40B4-BE49-F238E27FC236}">
+                    <a16:creationId xmlns:a16="http://schemas.microsoft.com/office/drawing/2014/main" id="{BAFE549D-E9DD-4384-8C3E-1BCAA4891792}"/>
+                  </a:ext>
+                </a:extLst>
+              </p:cNvPr>
+              <p:cNvSpPr/>
+              <p:nvPr/>
+            </p:nvSpPr>
+            <p:spPr>
+              <a:xfrm>
+                <a:off x="3039950" y="6119081"/>
+                <a:ext cx="428882" cy="420442"/>
+              </a:xfrm>
+              <a:prstGeom prst="rect">
+                <a:avLst/>
+              </a:prstGeom>
+            </p:spPr>
+            <p:style>
+              <a:lnRef idx="2">
+                <a:schemeClr val="accent1">
+                  <a:shade val="50000"/>
+                </a:schemeClr>
+              </a:lnRef>
+              <a:fillRef idx="1">
+                <a:schemeClr val="accent1"/>
+              </a:fillRef>
+              <a:effectRef idx="0">
+                <a:schemeClr val="accent1"/>
+              </a:effectRef>
+              <a:fontRef idx="minor">
+                <a:schemeClr val="lt1"/>
+              </a:fontRef>
+            </p:style>
+            <p:txBody>
+              <a:bodyPr rtlCol="0" anchor="ctr"/>
+              <a:lstStyle/>
+              <a:p>
+                <a:pPr algn="ctr"/>
+                <a:endParaRPr lang="en-US"/>
+              </a:p>
+            </p:txBody>
+          </p:sp>
+        </p:grpSp>
+      </p:grpSp>
+      <p:grpSp>
+        <p:nvGrpSpPr>
+          <p:cNvPr id="23" name="Group 22">
+            <a:extLst>
+              <a:ext uri="{FF2B5EF4-FFF2-40B4-BE49-F238E27FC236}">
+                <a16:creationId xmlns:a16="http://schemas.microsoft.com/office/drawing/2014/main" id="{B49E50F4-5213-46E0-B0B4-AA2E1741B179}"/>
+              </a:ext>
+            </a:extLst>
+          </p:cNvPr>
+          <p:cNvGrpSpPr/>
+          <p:nvPr/>
+        </p:nvGrpSpPr>
+        <p:grpSpPr>
+          <a:xfrm>
+            <a:off x="4721518" y="2291097"/>
+            <a:ext cx="2995999" cy="4259827"/>
+            <a:chOff x="1111755" y="2291097"/>
+            <a:chExt cx="2995999" cy="4259827"/>
+          </a:xfrm>
+        </p:grpSpPr>
+        <p:sp>
+          <p:nvSpPr>
+            <p:cNvPr id="24" name="Rectangle 23">
+              <a:extLst>
+                <a:ext uri="{FF2B5EF4-FFF2-40B4-BE49-F238E27FC236}">
+                  <a16:creationId xmlns:a16="http://schemas.microsoft.com/office/drawing/2014/main" id="{79EDC2DF-0C70-4F6A-8373-F4CC6FE5F03A}"/>
+                </a:ext>
+              </a:extLst>
+            </p:cNvPr>
+            <p:cNvSpPr/>
+            <p:nvPr/>
+          </p:nvSpPr>
+          <p:spPr>
+            <a:xfrm>
+              <a:off x="1111755" y="2291097"/>
+              <a:ext cx="2995998" cy="3072469"/>
+            </a:xfrm>
+            <a:prstGeom prst="rect">
+              <a:avLst/>
+            </a:prstGeom>
+          </p:spPr>
+          <p:style>
+            <a:lnRef idx="2">
+              <a:schemeClr val="accent6"/>
+            </a:lnRef>
+            <a:fillRef idx="1">
+              <a:schemeClr val="lt1"/>
+            </a:fillRef>
+            <a:effectRef idx="0">
+              <a:schemeClr val="accent6"/>
+            </a:effectRef>
+            <a:fontRef idx="minor">
+              <a:schemeClr val="dk1"/>
+            </a:fontRef>
+          </p:style>
+          <p:txBody>
+            <a:bodyPr rtlCol="0" anchor="ctr"/>
+            <a:lstStyle/>
+            <a:p>
+              <a:pPr algn="ctr"/>
+              <a:r>
+                <a:rPr lang="en-US" dirty="0"/>
+                <a:t>IMAGE</a:t>
+              </a:r>
+            </a:p>
+          </p:txBody>
+        </p:sp>
+        <p:grpSp>
+          <p:nvGrpSpPr>
+            <p:cNvPr id="25" name="Group 24">
+              <a:extLst>
+                <a:ext uri="{FF2B5EF4-FFF2-40B4-BE49-F238E27FC236}">
+                  <a16:creationId xmlns:a16="http://schemas.microsoft.com/office/drawing/2014/main" id="{EFB09CB7-4A6E-4B21-A426-45B14494562B}"/>
+                </a:ext>
+              </a:extLst>
+            </p:cNvPr>
+            <p:cNvGrpSpPr/>
+            <p:nvPr/>
+          </p:nvGrpSpPr>
+          <p:grpSpPr>
+            <a:xfrm>
+              <a:off x="1111756" y="5377214"/>
+              <a:ext cx="2995998" cy="1173710"/>
+              <a:chOff x="1098108" y="5445454"/>
+              <a:chExt cx="2995998" cy="1173710"/>
+            </a:xfrm>
+          </p:grpSpPr>
+          <p:sp>
+            <p:nvSpPr>
+              <p:cNvPr id="26" name="Rectangle 25">
+                <a:extLst>
+                  <a:ext uri="{FF2B5EF4-FFF2-40B4-BE49-F238E27FC236}">
+                    <a16:creationId xmlns:a16="http://schemas.microsoft.com/office/drawing/2014/main" id="{3F66C16E-C4E5-47AC-8DDE-B3782F547222}"/>
+                  </a:ext>
+                </a:extLst>
+              </p:cNvPr>
+              <p:cNvSpPr/>
+              <p:nvPr/>
+            </p:nvSpPr>
+            <p:spPr>
+              <a:xfrm>
+                <a:off x="1098108" y="5445454"/>
+                <a:ext cx="2995998" cy="1173710"/>
+              </a:xfrm>
+              <a:prstGeom prst="rect">
+                <a:avLst/>
+              </a:prstGeom>
+              <a:solidFill>
+                <a:schemeClr val="bg1">
+                  <a:lumMod val="95000"/>
+                </a:schemeClr>
+              </a:solidFill>
+              <a:ln>
+                <a:solidFill>
+                  <a:schemeClr val="tx1">
+                    <a:lumMod val="50000"/>
+                    <a:lumOff val="50000"/>
+                  </a:schemeClr>
+                </a:solidFill>
+              </a:ln>
+            </p:spPr>
+            <p:style>
+              <a:lnRef idx="0">
+                <a:scrgbClr r="0" g="0" b="0"/>
+              </a:lnRef>
+              <a:fillRef idx="0">
+                <a:scrgbClr r="0" g="0" b="0"/>
+              </a:fillRef>
+              <a:effectRef idx="0">
+                <a:scrgbClr r="0" g="0" b="0"/>
+              </a:effectRef>
+              <a:fontRef idx="minor">
+                <a:schemeClr val="lt1"/>
+              </a:fontRef>
+            </p:style>
+            <p:txBody>
+              <a:bodyPr rtlCol="0" anchor="ctr"/>
+              <a:lstStyle/>
+              <a:p>
+                <a:pPr algn="ctr"/>
+                <a:endParaRPr lang="en-US" dirty="0"/>
+              </a:p>
+            </p:txBody>
+          </p:sp>
+          <p:sp>
+            <p:nvSpPr>
+              <p:cNvPr id="27" name="TextBox 26">
+                <a:extLst>
+                  <a:ext uri="{FF2B5EF4-FFF2-40B4-BE49-F238E27FC236}">
+                    <a16:creationId xmlns:a16="http://schemas.microsoft.com/office/drawing/2014/main" id="{2DABC730-88B4-4B00-BF9C-E1E17F81FA55}"/>
+                  </a:ext>
+                </a:extLst>
+              </p:cNvPr>
+              <p:cNvSpPr txBox="1"/>
+              <p:nvPr/>
+            </p:nvSpPr>
+            <p:spPr>
+              <a:xfrm>
+                <a:off x="1111755" y="5489036"/>
+                <a:ext cx="1080762" cy="338554"/>
+              </a:xfrm>
+              <a:prstGeom prst="rect">
+                <a:avLst/>
+              </a:prstGeom>
+              <a:noFill/>
+            </p:spPr>
+            <p:txBody>
+              <a:bodyPr wrap="square" rtlCol="0">
+                <a:spAutoFit/>
+              </a:bodyPr>
+              <a:lstStyle/>
+              <a:p>
+                <a:r>
+                  <a:rPr lang="en-US" sz="1600" dirty="0"/>
+                  <a:t>Name</a:t>
+                </a:r>
+              </a:p>
+            </p:txBody>
+          </p:sp>
+          <p:sp>
+            <p:nvSpPr>
+              <p:cNvPr id="28" name="Rectangle 27">
+                <a:extLst>
+                  <a:ext uri="{FF2B5EF4-FFF2-40B4-BE49-F238E27FC236}">
+                    <a16:creationId xmlns:a16="http://schemas.microsoft.com/office/drawing/2014/main" id="{0802695E-936A-4CD4-A593-7EEFCFD3BDD2}"/>
+                  </a:ext>
+                </a:extLst>
+              </p:cNvPr>
+              <p:cNvSpPr/>
+              <p:nvPr/>
+            </p:nvSpPr>
+            <p:spPr>
+              <a:xfrm>
+                <a:off x="1132610" y="5724812"/>
+                <a:ext cx="974947" cy="338554"/>
+              </a:xfrm>
+              <a:prstGeom prst="rect">
+                <a:avLst/>
+              </a:prstGeom>
+            </p:spPr>
+            <p:txBody>
+              <a:bodyPr wrap="none">
+                <a:spAutoFit/>
+              </a:bodyPr>
+              <a:lstStyle/>
+              <a:p>
+                <a:r>
+                  <a:rPr lang="en-US" sz="1600" dirty="0" err="1">
+                    <a:solidFill>
+                      <a:srgbClr val="222222"/>
+                    </a:solidFill>
+                  </a:rPr>
+                  <a:t>Speciality</a:t>
+                </a:r>
+                <a:endParaRPr lang="en-US" sz="1600" dirty="0"/>
+              </a:p>
+            </p:txBody>
+          </p:sp>
+          <p:sp>
+            <p:nvSpPr>
+              <p:cNvPr id="29" name="Rectangle 28">
+                <a:extLst>
+                  <a:ext uri="{FF2B5EF4-FFF2-40B4-BE49-F238E27FC236}">
+                    <a16:creationId xmlns:a16="http://schemas.microsoft.com/office/drawing/2014/main" id="{F673A988-C431-4A46-8E1C-9ABF5FA711BC}"/>
+                  </a:ext>
+                </a:extLst>
+              </p:cNvPr>
+              <p:cNvSpPr/>
+              <p:nvPr/>
+            </p:nvSpPr>
+            <p:spPr>
+              <a:xfrm>
+                <a:off x="1269240" y="6119081"/>
+                <a:ext cx="428882" cy="420442"/>
+              </a:xfrm>
+              <a:prstGeom prst="rect">
+                <a:avLst/>
+              </a:prstGeom>
+            </p:spPr>
+            <p:style>
+              <a:lnRef idx="2">
+                <a:schemeClr val="accent1">
+                  <a:shade val="50000"/>
+                </a:schemeClr>
+              </a:lnRef>
+              <a:fillRef idx="1">
+                <a:schemeClr val="accent1"/>
+              </a:fillRef>
+              <a:effectRef idx="0">
+                <a:schemeClr val="accent1"/>
+              </a:effectRef>
+              <a:fontRef idx="minor">
+                <a:schemeClr val="lt1"/>
+              </a:fontRef>
+            </p:style>
+            <p:txBody>
+              <a:bodyPr rtlCol="0" anchor="ctr"/>
+              <a:lstStyle/>
+              <a:p>
+                <a:pPr algn="ctr"/>
+                <a:endParaRPr lang="en-US"/>
+              </a:p>
+            </p:txBody>
+          </p:sp>
+          <p:sp>
+            <p:nvSpPr>
+              <p:cNvPr id="30" name="Rectangle 29">
+                <a:extLst>
+                  <a:ext uri="{FF2B5EF4-FFF2-40B4-BE49-F238E27FC236}">
+                    <a16:creationId xmlns:a16="http://schemas.microsoft.com/office/drawing/2014/main" id="{99E55024-7793-4675-AF87-CE12B1636BA3}"/>
+                  </a:ext>
+                </a:extLst>
+              </p:cNvPr>
+              <p:cNvSpPr/>
+              <p:nvPr/>
+            </p:nvSpPr>
+            <p:spPr>
+              <a:xfrm>
+                <a:off x="1841958" y="6120037"/>
+                <a:ext cx="428882" cy="420442"/>
+              </a:xfrm>
+              <a:prstGeom prst="rect">
+                <a:avLst/>
+              </a:prstGeom>
+            </p:spPr>
+            <p:style>
+              <a:lnRef idx="2">
+                <a:schemeClr val="accent1">
+                  <a:shade val="50000"/>
+                </a:schemeClr>
+              </a:lnRef>
+              <a:fillRef idx="1">
+                <a:schemeClr val="accent1"/>
+              </a:fillRef>
+              <a:effectRef idx="0">
+                <a:schemeClr val="accent1"/>
+              </a:effectRef>
+              <a:fontRef idx="minor">
+                <a:schemeClr val="lt1"/>
+              </a:fontRef>
+            </p:style>
+            <p:txBody>
+              <a:bodyPr rtlCol="0" anchor="ctr"/>
+              <a:lstStyle/>
+              <a:p>
+                <a:pPr algn="ctr"/>
+                <a:endParaRPr lang="en-US"/>
+              </a:p>
+            </p:txBody>
+          </p:sp>
+          <p:sp>
+            <p:nvSpPr>
+              <p:cNvPr id="31" name="Rectangle 30">
+                <a:extLst>
+                  <a:ext uri="{FF2B5EF4-FFF2-40B4-BE49-F238E27FC236}">
+                    <a16:creationId xmlns:a16="http://schemas.microsoft.com/office/drawing/2014/main" id="{ED96B4FE-149B-40FB-9A07-D03B578BED09}"/>
+                  </a:ext>
+                </a:extLst>
+              </p:cNvPr>
+              <p:cNvSpPr/>
+              <p:nvPr/>
+            </p:nvSpPr>
+            <p:spPr>
+              <a:xfrm>
+                <a:off x="2414676" y="6120037"/>
+                <a:ext cx="428882" cy="420442"/>
+              </a:xfrm>
+              <a:prstGeom prst="rect">
+                <a:avLst/>
+              </a:prstGeom>
+            </p:spPr>
+            <p:style>
+              <a:lnRef idx="2">
+                <a:schemeClr val="accent1">
+                  <a:shade val="50000"/>
+                </a:schemeClr>
+              </a:lnRef>
+              <a:fillRef idx="1">
+                <a:schemeClr val="accent1"/>
+              </a:fillRef>
+              <a:effectRef idx="0">
+                <a:schemeClr val="accent1"/>
+              </a:effectRef>
+              <a:fontRef idx="minor">
+                <a:schemeClr val="lt1"/>
+              </a:fontRef>
+            </p:style>
+            <p:txBody>
+              <a:bodyPr rtlCol="0" anchor="ctr"/>
+              <a:lstStyle/>
+              <a:p>
+                <a:pPr algn="ctr"/>
+                <a:endParaRPr lang="en-US"/>
+              </a:p>
+            </p:txBody>
+          </p:sp>
+          <p:sp>
+            <p:nvSpPr>
+              <p:cNvPr id="32" name="Rectangle 31">
+                <a:extLst>
+                  <a:ext uri="{FF2B5EF4-FFF2-40B4-BE49-F238E27FC236}">
+                    <a16:creationId xmlns:a16="http://schemas.microsoft.com/office/drawing/2014/main" id="{A7FA729A-A272-4738-B6D7-806A35B121B3}"/>
+                  </a:ext>
+                </a:extLst>
+              </p:cNvPr>
+              <p:cNvSpPr/>
+              <p:nvPr/>
+            </p:nvSpPr>
+            <p:spPr>
+              <a:xfrm>
+                <a:off x="3039950" y="6119081"/>
+                <a:ext cx="428882" cy="420442"/>
+              </a:xfrm>
+              <a:prstGeom prst="rect">
+                <a:avLst/>
+              </a:prstGeom>
+            </p:spPr>
+            <p:style>
+              <a:lnRef idx="2">
+                <a:schemeClr val="accent1">
+                  <a:shade val="50000"/>
+                </a:schemeClr>
+              </a:lnRef>
+              <a:fillRef idx="1">
+                <a:schemeClr val="accent1"/>
+              </a:fillRef>
+              <a:effectRef idx="0">
+                <a:schemeClr val="accent1"/>
+              </a:effectRef>
+              <a:fontRef idx="minor">
+                <a:schemeClr val="lt1"/>
+              </a:fontRef>
+            </p:style>
+            <p:txBody>
+              <a:bodyPr rtlCol="0" anchor="ctr"/>
+              <a:lstStyle/>
+              <a:p>
+                <a:pPr algn="ctr"/>
+                <a:endParaRPr lang="en-US"/>
+              </a:p>
+            </p:txBody>
+          </p:sp>
+        </p:grpSp>
+      </p:grpSp>
+      <p:grpSp>
+        <p:nvGrpSpPr>
+          <p:cNvPr id="33" name="Group 32">
+            <a:extLst>
+              <a:ext uri="{FF2B5EF4-FFF2-40B4-BE49-F238E27FC236}">
+                <a16:creationId xmlns:a16="http://schemas.microsoft.com/office/drawing/2014/main" id="{D7E40B19-42C7-44CE-8444-8D905B1177DF}"/>
+              </a:ext>
+            </a:extLst>
+          </p:cNvPr>
+          <p:cNvGrpSpPr/>
+          <p:nvPr/>
+        </p:nvGrpSpPr>
+        <p:grpSpPr>
+          <a:xfrm>
+            <a:off x="8306876" y="2291097"/>
+            <a:ext cx="2995999" cy="4259827"/>
+            <a:chOff x="1111755" y="2291097"/>
+            <a:chExt cx="2995999" cy="4259827"/>
+          </a:xfrm>
+        </p:grpSpPr>
+        <p:sp>
+          <p:nvSpPr>
+            <p:cNvPr id="34" name="Rectangle 33">
+              <a:extLst>
+                <a:ext uri="{FF2B5EF4-FFF2-40B4-BE49-F238E27FC236}">
+                  <a16:creationId xmlns:a16="http://schemas.microsoft.com/office/drawing/2014/main" id="{FED5869B-1369-42F4-8B9B-F2A39C48E0A9}"/>
+                </a:ext>
+              </a:extLst>
+            </p:cNvPr>
+            <p:cNvSpPr/>
+            <p:nvPr/>
+          </p:nvSpPr>
+          <p:spPr>
+            <a:xfrm>
+              <a:off x="1111755" y="2291097"/>
+              <a:ext cx="2995998" cy="3072469"/>
+            </a:xfrm>
+            <a:prstGeom prst="rect">
+              <a:avLst/>
+            </a:prstGeom>
+          </p:spPr>
+          <p:style>
+            <a:lnRef idx="2">
+              <a:schemeClr val="accent6"/>
+            </a:lnRef>
+            <a:fillRef idx="1">
+              <a:schemeClr val="lt1"/>
+            </a:fillRef>
+            <a:effectRef idx="0">
+              <a:schemeClr val="accent6"/>
+            </a:effectRef>
+            <a:fontRef idx="minor">
+              <a:schemeClr val="dk1"/>
+            </a:fontRef>
+          </p:style>
+          <p:txBody>
+            <a:bodyPr rtlCol="0" anchor="ctr"/>
+            <a:lstStyle/>
+            <a:p>
+              <a:pPr algn="ctr"/>
+              <a:r>
+                <a:rPr lang="en-US" dirty="0"/>
+                <a:t>IMAGE</a:t>
+              </a:r>
+            </a:p>
+          </p:txBody>
+        </p:sp>
+        <p:grpSp>
+          <p:nvGrpSpPr>
+            <p:cNvPr id="35" name="Group 34">
+              <a:extLst>
+                <a:ext uri="{FF2B5EF4-FFF2-40B4-BE49-F238E27FC236}">
+                  <a16:creationId xmlns:a16="http://schemas.microsoft.com/office/drawing/2014/main" id="{84FC4EE8-F5E2-4556-81EE-A1781D50488A}"/>
+                </a:ext>
+              </a:extLst>
+            </p:cNvPr>
+            <p:cNvGrpSpPr/>
+            <p:nvPr/>
+          </p:nvGrpSpPr>
+          <p:grpSpPr>
+            <a:xfrm>
+              <a:off x="1111756" y="5377214"/>
+              <a:ext cx="2995998" cy="1173710"/>
+              <a:chOff x="1098108" y="5445454"/>
+              <a:chExt cx="2995998" cy="1173710"/>
+            </a:xfrm>
+          </p:grpSpPr>
+          <p:sp>
+            <p:nvSpPr>
+              <p:cNvPr id="36" name="Rectangle 35">
+                <a:extLst>
+                  <a:ext uri="{FF2B5EF4-FFF2-40B4-BE49-F238E27FC236}">
+                    <a16:creationId xmlns:a16="http://schemas.microsoft.com/office/drawing/2014/main" id="{5D51054B-2E2E-4C6D-90DA-A6FE4F3DA65E}"/>
+                  </a:ext>
+                </a:extLst>
+              </p:cNvPr>
+              <p:cNvSpPr/>
+              <p:nvPr/>
+            </p:nvSpPr>
+            <p:spPr>
+              <a:xfrm>
+                <a:off x="1098108" y="5445454"/>
+                <a:ext cx="2995998" cy="1173710"/>
+              </a:xfrm>
+              <a:prstGeom prst="rect">
+                <a:avLst/>
+              </a:prstGeom>
+              <a:solidFill>
+                <a:schemeClr val="bg1">
+                  <a:lumMod val="95000"/>
+                </a:schemeClr>
+              </a:solidFill>
+              <a:ln>
+                <a:solidFill>
+                  <a:schemeClr val="tx1">
+                    <a:lumMod val="50000"/>
+                    <a:lumOff val="50000"/>
+                  </a:schemeClr>
+                </a:solidFill>
+              </a:ln>
+            </p:spPr>
+            <p:style>
+              <a:lnRef idx="0">
+                <a:scrgbClr r="0" g="0" b="0"/>
+              </a:lnRef>
+              <a:fillRef idx="0">
+                <a:scrgbClr r="0" g="0" b="0"/>
+              </a:fillRef>
+              <a:effectRef idx="0">
+                <a:scrgbClr r="0" g="0" b="0"/>
+              </a:effectRef>
+              <a:fontRef idx="minor">
+                <a:schemeClr val="lt1"/>
+              </a:fontRef>
+            </p:style>
+            <p:txBody>
+              <a:bodyPr rtlCol="0" anchor="ctr"/>
+              <a:lstStyle/>
+              <a:p>
+                <a:pPr algn="ctr"/>
+                <a:endParaRPr lang="en-US" dirty="0"/>
+              </a:p>
+            </p:txBody>
+          </p:sp>
+          <p:sp>
+            <p:nvSpPr>
+              <p:cNvPr id="37" name="TextBox 36">
+                <a:extLst>
+                  <a:ext uri="{FF2B5EF4-FFF2-40B4-BE49-F238E27FC236}">
+                    <a16:creationId xmlns:a16="http://schemas.microsoft.com/office/drawing/2014/main" id="{928AB1B9-A44D-4297-8424-9DE8809B5E7A}"/>
+                  </a:ext>
+                </a:extLst>
+              </p:cNvPr>
+              <p:cNvSpPr txBox="1"/>
+              <p:nvPr/>
+            </p:nvSpPr>
+            <p:spPr>
+              <a:xfrm>
+                <a:off x="1111755" y="5489036"/>
+                <a:ext cx="1080762" cy="338554"/>
+              </a:xfrm>
+              <a:prstGeom prst="rect">
+                <a:avLst/>
+              </a:prstGeom>
+              <a:noFill/>
+            </p:spPr>
+            <p:txBody>
+              <a:bodyPr wrap="square" rtlCol="0">
+                <a:spAutoFit/>
+              </a:bodyPr>
+              <a:lstStyle/>
+              <a:p>
+                <a:r>
+                  <a:rPr lang="en-US" sz="1600" dirty="0"/>
+                  <a:t>Name</a:t>
+                </a:r>
+              </a:p>
+            </p:txBody>
+          </p:sp>
+          <p:sp>
+            <p:nvSpPr>
+              <p:cNvPr id="38" name="Rectangle 37">
+                <a:extLst>
+                  <a:ext uri="{FF2B5EF4-FFF2-40B4-BE49-F238E27FC236}">
+                    <a16:creationId xmlns:a16="http://schemas.microsoft.com/office/drawing/2014/main" id="{EB509767-0276-4EE8-9622-1E5E51D00B5A}"/>
+                  </a:ext>
+                </a:extLst>
+              </p:cNvPr>
+              <p:cNvSpPr/>
+              <p:nvPr/>
+            </p:nvSpPr>
+            <p:spPr>
+              <a:xfrm>
+                <a:off x="1132610" y="5724812"/>
+                <a:ext cx="974947" cy="338554"/>
+              </a:xfrm>
+              <a:prstGeom prst="rect">
+                <a:avLst/>
+              </a:prstGeom>
+            </p:spPr>
+            <p:txBody>
+              <a:bodyPr wrap="none">
+                <a:spAutoFit/>
+              </a:bodyPr>
+              <a:lstStyle/>
+              <a:p>
+                <a:r>
+                  <a:rPr lang="en-US" sz="1600" dirty="0" err="1">
+                    <a:solidFill>
+                      <a:srgbClr val="222222"/>
+                    </a:solidFill>
+                  </a:rPr>
+                  <a:t>Speciality</a:t>
+                </a:r>
+                <a:endParaRPr lang="en-US" sz="1600" dirty="0"/>
+              </a:p>
+            </p:txBody>
+          </p:sp>
+          <p:sp>
+            <p:nvSpPr>
+              <p:cNvPr id="39" name="Rectangle 38">
+                <a:extLst>
+                  <a:ext uri="{FF2B5EF4-FFF2-40B4-BE49-F238E27FC236}">
+                    <a16:creationId xmlns:a16="http://schemas.microsoft.com/office/drawing/2014/main" id="{79546EAC-4ACF-4E08-9D65-5E0918E78061}"/>
+                  </a:ext>
+                </a:extLst>
+              </p:cNvPr>
+              <p:cNvSpPr/>
+              <p:nvPr/>
+            </p:nvSpPr>
+            <p:spPr>
+              <a:xfrm>
+                <a:off x="1269240" y="6119081"/>
+                <a:ext cx="428882" cy="420442"/>
+              </a:xfrm>
+              <a:prstGeom prst="rect">
+                <a:avLst/>
+              </a:prstGeom>
+            </p:spPr>
+            <p:style>
+              <a:lnRef idx="2">
+                <a:schemeClr val="accent1">
+                  <a:shade val="50000"/>
+                </a:schemeClr>
+              </a:lnRef>
+              <a:fillRef idx="1">
+                <a:schemeClr val="accent1"/>
+              </a:fillRef>
+              <a:effectRef idx="0">
+                <a:schemeClr val="accent1"/>
+              </a:effectRef>
+              <a:fontRef idx="minor">
+                <a:schemeClr val="lt1"/>
+              </a:fontRef>
+            </p:style>
+            <p:txBody>
+              <a:bodyPr rtlCol="0" anchor="ctr"/>
+              <a:lstStyle/>
+              <a:p>
+                <a:pPr algn="ctr"/>
+                <a:endParaRPr lang="en-US"/>
+              </a:p>
+            </p:txBody>
+          </p:sp>
+          <p:sp>
+            <p:nvSpPr>
+              <p:cNvPr id="40" name="Rectangle 39">
+                <a:extLst>
+                  <a:ext uri="{FF2B5EF4-FFF2-40B4-BE49-F238E27FC236}">
+                    <a16:creationId xmlns:a16="http://schemas.microsoft.com/office/drawing/2014/main" id="{4C44D9A6-7741-4E90-B1BC-9F2F07FD6BBB}"/>
+                  </a:ext>
+                </a:extLst>
+              </p:cNvPr>
+              <p:cNvSpPr/>
+              <p:nvPr/>
+            </p:nvSpPr>
+            <p:spPr>
+              <a:xfrm>
+                <a:off x="1841958" y="6120037"/>
+                <a:ext cx="428882" cy="420442"/>
+              </a:xfrm>
+              <a:prstGeom prst="rect">
+                <a:avLst/>
+              </a:prstGeom>
+            </p:spPr>
+            <p:style>
+              <a:lnRef idx="2">
+                <a:schemeClr val="accent1">
+                  <a:shade val="50000"/>
+                </a:schemeClr>
+              </a:lnRef>
+              <a:fillRef idx="1">
+                <a:schemeClr val="accent1"/>
+              </a:fillRef>
+              <a:effectRef idx="0">
+                <a:schemeClr val="accent1"/>
+              </a:effectRef>
+              <a:fontRef idx="minor">
+                <a:schemeClr val="lt1"/>
+              </a:fontRef>
+            </p:style>
+            <p:txBody>
+              <a:bodyPr rtlCol="0" anchor="ctr"/>
+              <a:lstStyle/>
+              <a:p>
+                <a:pPr algn="ctr"/>
+                <a:endParaRPr lang="en-US"/>
+              </a:p>
+            </p:txBody>
+          </p:sp>
+          <p:sp>
+            <p:nvSpPr>
+              <p:cNvPr id="41" name="Rectangle 40">
+                <a:extLst>
+                  <a:ext uri="{FF2B5EF4-FFF2-40B4-BE49-F238E27FC236}">
+                    <a16:creationId xmlns:a16="http://schemas.microsoft.com/office/drawing/2014/main" id="{CAE2B44C-FB37-4FDE-B770-50A6AE29F9DD}"/>
+                  </a:ext>
+                </a:extLst>
+              </p:cNvPr>
+              <p:cNvSpPr/>
+              <p:nvPr/>
+            </p:nvSpPr>
+            <p:spPr>
+              <a:xfrm>
+                <a:off x="2414676" y="6120037"/>
+                <a:ext cx="428882" cy="420442"/>
+              </a:xfrm>
+              <a:prstGeom prst="rect">
+                <a:avLst/>
+              </a:prstGeom>
+            </p:spPr>
+            <p:style>
+              <a:lnRef idx="2">
+                <a:schemeClr val="accent1">
+                  <a:shade val="50000"/>
+                </a:schemeClr>
+              </a:lnRef>
+              <a:fillRef idx="1">
+                <a:schemeClr val="accent1"/>
+              </a:fillRef>
+              <a:effectRef idx="0">
+                <a:schemeClr val="accent1"/>
+              </a:effectRef>
+              <a:fontRef idx="minor">
+                <a:schemeClr val="lt1"/>
+              </a:fontRef>
+            </p:style>
+            <p:txBody>
+              <a:bodyPr rtlCol="0" anchor="ctr"/>
+              <a:lstStyle/>
+              <a:p>
+                <a:pPr algn="ctr"/>
+                <a:endParaRPr lang="en-US"/>
+              </a:p>
+            </p:txBody>
+          </p:sp>
+          <p:sp>
+            <p:nvSpPr>
+              <p:cNvPr id="42" name="Rectangle 41">
+                <a:extLst>
+                  <a:ext uri="{FF2B5EF4-FFF2-40B4-BE49-F238E27FC236}">
+                    <a16:creationId xmlns:a16="http://schemas.microsoft.com/office/drawing/2014/main" id="{BAF6A315-DD27-4955-8817-777C17CA0C89}"/>
+                  </a:ext>
+                </a:extLst>
+              </p:cNvPr>
+              <p:cNvSpPr/>
+              <p:nvPr/>
+            </p:nvSpPr>
+            <p:spPr>
+              <a:xfrm>
+                <a:off x="3039950" y="6119081"/>
+                <a:ext cx="428882" cy="420442"/>
+              </a:xfrm>
+              <a:prstGeom prst="rect">
+                <a:avLst/>
+              </a:prstGeom>
+            </p:spPr>
+            <p:style>
+              <a:lnRef idx="2">
+                <a:schemeClr val="accent1">
+                  <a:shade val="50000"/>
+                </a:schemeClr>
+              </a:lnRef>
+              <a:fillRef idx="1">
+                <a:schemeClr val="accent1"/>
+              </a:fillRef>
+              <a:effectRef idx="0">
+                <a:schemeClr val="accent1"/>
+              </a:effectRef>
+              <a:fontRef idx="minor">
+                <a:schemeClr val="lt1"/>
+              </a:fontRef>
+            </p:style>
+            <p:txBody>
+              <a:bodyPr rtlCol="0" anchor="ctr"/>
+              <a:lstStyle/>
+              <a:p>
+                <a:pPr algn="ctr"/>
+                <a:endParaRPr lang="en-US"/>
+              </a:p>
+            </p:txBody>
+          </p:sp>
+        </p:grpSp>
+      </p:grpSp>
+    </p:spTree>
+    <p:extLst>
+      <p:ext uri="{BB962C8B-B14F-4D97-AF65-F5344CB8AC3E}">
+        <p14:creationId xmlns:p14="http://schemas.microsoft.com/office/powerpoint/2010/main" val="1339181462"/>
+      </p:ext>
+    </p:extLst>
+  </p:cSld>
+  <p:clrMapOvr>
+    <a:masterClrMapping/>
+  </p:clrMapOvr>
+</p:sld>
+</file>
+
+<file path=ppt/slides/slide6.xml><?xml version="1.0" encoding="utf-8"?>
 <p:sld xmlns:a="http://schemas.openxmlformats.org/drawingml/2006/main" xmlns:r="http://schemas.openxmlformats.org/officeDocument/2006/relationships" xmlns:p="http://schemas.openxmlformats.org/presentationml/2006/main">
   <p:cSld>
     <p:spTree>

</xml_diff>